<commit_message>
btw e $ coins
Coloquei as moedinhas.
</commit_message>
<xml_diff>
--- a/Institucional.pptx
+++ b/Institucional.pptx
@@ -118,7 +118,7 @@
   </p:defaultTextStyle>
   <p:extLst>
     <p:ext uri="{EFAFB233-063F-42B5-8137-9DF3F51BA10A}">
-      <p15:sldGuideLst xmlns:p15="http://schemas.microsoft.com/office/powerpoint/2012/main" xmlns=""/>
+      <p15:sldGuideLst xmlns="" xmlns:p15="http://schemas.microsoft.com/office/powerpoint/2012/main"/>
     </p:ext>
   </p:extLst>
 </p:presentation>
@@ -1264,17 +1264,17 @@
     </dgm:pt>
   </dgm:ptLst>
   <dgm:cxnLst>
+    <dgm:cxn modelId="{50F2AFC6-618A-4B16-B9A6-9AF08BD4F681}" type="presOf" srcId="{C2B21BD2-1CC6-4851-9755-31A6335F2D27}" destId="{F9729B91-535E-45C1-A48C-DA70FD3E3A1A}" srcOrd="0" destOrd="0" presId="urn:microsoft.com/office/officeart/2005/8/layout/hProcess9"/>
+    <dgm:cxn modelId="{59D0191B-05C3-47F6-BC18-092DF82AEA4E}" srcId="{33AD95BC-04AC-4C9D-A1BF-A848AF08870A}" destId="{6213ABF1-921A-402D-8E47-346581013F04}" srcOrd="4" destOrd="0" parTransId="{1CEA60A9-A592-4FAE-986F-A88F4FA67C27}" sibTransId="{DD08AFCC-BB1D-4E54-845F-ADFDA23795DF}"/>
+    <dgm:cxn modelId="{17F27C24-3F3B-4B7B-81BF-4E496A852E10}" type="presOf" srcId="{78862ABC-67F6-469F-9312-BE89DA2868F8}" destId="{8D38DCC3-0AC0-4910-8A46-CDDAB05465F4}" srcOrd="0" destOrd="0" presId="urn:microsoft.com/office/officeart/2005/8/layout/hProcess9"/>
+    <dgm:cxn modelId="{7268FF49-3026-47CA-B7DE-E07C53A8C9EE}" type="presOf" srcId="{DC563ACC-F8B8-4D9B-9536-4F48B1BC5C22}" destId="{9194ED45-4CDD-45D8-B521-B70CF5A2D7F8}" srcOrd="0" destOrd="0" presId="urn:microsoft.com/office/officeart/2005/8/layout/hProcess9"/>
+    <dgm:cxn modelId="{B97E8DC4-0BCE-45C7-90B6-243F56729C83}" type="presOf" srcId="{7A23EF24-F0A3-4A4A-B8A9-3AD68A0CA865}" destId="{0182BEBC-9981-49C0-B9ED-1F11543CFB0B}" srcOrd="0" destOrd="0" presId="urn:microsoft.com/office/officeart/2005/8/layout/hProcess9"/>
+    <dgm:cxn modelId="{9FE18D44-2A1B-4DB8-85B3-79E4C5D3F6EC}" type="presOf" srcId="{6213ABF1-921A-402D-8E47-346581013F04}" destId="{C0205760-BE29-40C1-87A9-6551C62F8F16}" srcOrd="0" destOrd="0" presId="urn:microsoft.com/office/officeart/2005/8/layout/hProcess9"/>
+    <dgm:cxn modelId="{0B645BC5-08F5-4BAA-93B0-0A9D63C6BD6A}" srcId="{33AD95BC-04AC-4C9D-A1BF-A848AF08870A}" destId="{78862ABC-67F6-469F-9312-BE89DA2868F8}" srcOrd="2" destOrd="0" parTransId="{F5CA9C11-610C-44A1-B699-51A92DBFF798}" sibTransId="{A5DFDB98-4387-4A0B-9F4B-DD13CA451585}"/>
+    <dgm:cxn modelId="{55F66B98-8739-4CC1-B2DA-D99D20B5A64F}" type="presOf" srcId="{33AD95BC-04AC-4C9D-A1BF-A848AF08870A}" destId="{88B13068-8133-499A-9B2E-1E0D62310F7F}" srcOrd="0" destOrd="0" presId="urn:microsoft.com/office/officeart/2005/8/layout/hProcess9"/>
+    <dgm:cxn modelId="{7BD634B1-D322-4132-93AD-7E67A5FBFC7E}" srcId="{33AD95BC-04AC-4C9D-A1BF-A848AF08870A}" destId="{DC563ACC-F8B8-4D9B-9536-4F48B1BC5C22}" srcOrd="3" destOrd="0" parTransId="{3630FC5E-999A-4BE9-991B-3DF8F3731355}" sibTransId="{8E340BB7-23E6-4016-898F-F739ABAC7F8F}"/>
     <dgm:cxn modelId="{BF169006-73E3-4560-A216-336D9B9CAEE8}" srcId="{33AD95BC-04AC-4C9D-A1BF-A848AF08870A}" destId="{7A23EF24-F0A3-4A4A-B8A9-3AD68A0CA865}" srcOrd="0" destOrd="0" parTransId="{8F50654C-02A0-4871-B110-0A0C3A8A8C58}" sibTransId="{99B6C9D7-B220-4DFB-91F3-A8A123786F9C}"/>
     <dgm:cxn modelId="{853805CC-BB75-481B-99B5-D2FFD0775AFB}" srcId="{33AD95BC-04AC-4C9D-A1BF-A848AF08870A}" destId="{C2B21BD2-1CC6-4851-9755-31A6335F2D27}" srcOrd="1" destOrd="0" parTransId="{AB6BC6D7-C02A-40C7-9F89-1408AFEC63CF}" sibTransId="{1B833879-9C97-42A3-A06F-43A3D1BE2C96}"/>
-    <dgm:cxn modelId="{59D0191B-05C3-47F6-BC18-092DF82AEA4E}" srcId="{33AD95BC-04AC-4C9D-A1BF-A848AF08870A}" destId="{6213ABF1-921A-402D-8E47-346581013F04}" srcOrd="4" destOrd="0" parTransId="{1CEA60A9-A592-4FAE-986F-A88F4FA67C27}" sibTransId="{DD08AFCC-BB1D-4E54-845F-ADFDA23795DF}"/>
-    <dgm:cxn modelId="{17F27C24-3F3B-4B7B-81BF-4E496A852E10}" type="presOf" srcId="{78862ABC-67F6-469F-9312-BE89DA2868F8}" destId="{8D38DCC3-0AC0-4910-8A46-CDDAB05465F4}" srcOrd="0" destOrd="0" presId="urn:microsoft.com/office/officeart/2005/8/layout/hProcess9"/>
-    <dgm:cxn modelId="{7BD634B1-D322-4132-93AD-7E67A5FBFC7E}" srcId="{33AD95BC-04AC-4C9D-A1BF-A848AF08870A}" destId="{DC563ACC-F8B8-4D9B-9536-4F48B1BC5C22}" srcOrd="3" destOrd="0" parTransId="{3630FC5E-999A-4BE9-991B-3DF8F3731355}" sibTransId="{8E340BB7-23E6-4016-898F-F739ABAC7F8F}"/>
-    <dgm:cxn modelId="{50F2AFC6-618A-4B16-B9A6-9AF08BD4F681}" type="presOf" srcId="{C2B21BD2-1CC6-4851-9755-31A6335F2D27}" destId="{F9729B91-535E-45C1-A48C-DA70FD3E3A1A}" srcOrd="0" destOrd="0" presId="urn:microsoft.com/office/officeart/2005/8/layout/hProcess9"/>
-    <dgm:cxn modelId="{55F66B98-8739-4CC1-B2DA-D99D20B5A64F}" type="presOf" srcId="{33AD95BC-04AC-4C9D-A1BF-A848AF08870A}" destId="{88B13068-8133-499A-9B2E-1E0D62310F7F}" srcOrd="0" destOrd="0" presId="urn:microsoft.com/office/officeart/2005/8/layout/hProcess9"/>
-    <dgm:cxn modelId="{B97E8DC4-0BCE-45C7-90B6-243F56729C83}" type="presOf" srcId="{7A23EF24-F0A3-4A4A-B8A9-3AD68A0CA865}" destId="{0182BEBC-9981-49C0-B9ED-1F11543CFB0B}" srcOrd="0" destOrd="0" presId="urn:microsoft.com/office/officeart/2005/8/layout/hProcess9"/>
-    <dgm:cxn modelId="{9FE18D44-2A1B-4DB8-85B3-79E4C5D3F6EC}" type="presOf" srcId="{6213ABF1-921A-402D-8E47-346581013F04}" destId="{C0205760-BE29-40C1-87A9-6551C62F8F16}" srcOrd="0" destOrd="0" presId="urn:microsoft.com/office/officeart/2005/8/layout/hProcess9"/>
-    <dgm:cxn modelId="{7268FF49-3026-47CA-B7DE-E07C53A8C9EE}" type="presOf" srcId="{DC563ACC-F8B8-4D9B-9536-4F48B1BC5C22}" destId="{9194ED45-4CDD-45D8-B521-B70CF5A2D7F8}" srcOrd="0" destOrd="0" presId="urn:microsoft.com/office/officeart/2005/8/layout/hProcess9"/>
-    <dgm:cxn modelId="{0B645BC5-08F5-4BAA-93B0-0A9D63C6BD6A}" srcId="{33AD95BC-04AC-4C9D-A1BF-A848AF08870A}" destId="{78862ABC-67F6-469F-9312-BE89DA2868F8}" srcOrd="2" destOrd="0" parTransId="{F5CA9C11-610C-44A1-B699-51A92DBFF798}" sibTransId="{A5DFDB98-4387-4A0B-9F4B-DD13CA451585}"/>
     <dgm:cxn modelId="{0AE35DE3-A9D5-44F2-84A8-99B7C36AAE98}" type="presParOf" srcId="{88B13068-8133-499A-9B2E-1E0D62310F7F}" destId="{42D84297-EE45-43CA-8F57-B335DE2EA067}" srcOrd="0" destOrd="0" presId="urn:microsoft.com/office/officeart/2005/8/layout/hProcess9"/>
     <dgm:cxn modelId="{FEB80852-3E5B-4BBB-B31E-F2643C97E9E2}" type="presParOf" srcId="{88B13068-8133-499A-9B2E-1E0D62310F7F}" destId="{21EC0AD3-E6AA-4050-B070-799AE2D54880}" srcOrd="1" destOrd="0" presId="urn:microsoft.com/office/officeart/2005/8/layout/hProcess9"/>
     <dgm:cxn modelId="{01E91F7C-0D71-4BA3-B2DA-B92CA91B6677}" type="presParOf" srcId="{21EC0AD3-E6AA-4050-B070-799AE2D54880}" destId="{0182BEBC-9981-49C0-B9ED-1F11543CFB0B}" srcOrd="0" destOrd="0" presId="urn:microsoft.com/office/officeart/2005/8/layout/hProcess9"/>
@@ -1291,14 +1291,14 @@
   <dgm:whole/>
   <dgm:extLst>
     <a:ext uri="http://schemas.microsoft.com/office/drawing/2008/diagram">
-      <dsp:dataModelExt xmlns:dsp="http://schemas.microsoft.com/office/drawing/2008/diagram" xmlns="" relId="rId12" minVer="http://schemas.openxmlformats.org/drawingml/2006/diagram"/>
+      <dsp:dataModelExt xmlns:dsp="http://schemas.microsoft.com/office/drawing/2008/diagram" relId="rId12" minVer="http://schemas.openxmlformats.org/drawingml/2006/diagram"/>
     </a:ext>
   </dgm:extLst>
 </dgm:dataModel>
 </file>
 
 <file path=ppt/diagrams/drawing1.xml><?xml version="1.0" encoding="utf-8"?>
-<dsp:drawing xmlns:dgm="http://schemas.openxmlformats.org/drawingml/2006/diagram" xmlns:a="http://schemas.openxmlformats.org/drawingml/2006/main" xmlns:dsp="http://schemas.microsoft.com/office/drawing/2008/diagram">
+<dsp:drawing xmlns:dgm="http://schemas.openxmlformats.org/drawingml/2006/diagram" xmlns:dsp="http://schemas.microsoft.com/office/drawing/2008/diagram" xmlns:a="http://schemas.openxmlformats.org/drawingml/2006/main">
   <dsp:spTree>
     <dsp:nvGrpSpPr>
       <dsp:cNvPr id="0" name=""/>
@@ -1419,8 +1419,8 @@
         </a:p>
       </dsp:txBody>
       <dsp:txXfrm>
-        <a:off x="4292" y="1196602"/>
-        <a:ext cx="1876661" cy="1595470"/>
+        <a:off x="82176" y="1274486"/>
+        <a:ext cx="1720893" cy="1439702"/>
       </dsp:txXfrm>
     </dsp:sp>
     <dsp:sp modelId="{F9729B91-535E-45C1-A48C-DA70FD3E3A1A}">
@@ -1497,8 +1497,8 @@
         </a:p>
       </dsp:txBody>
       <dsp:txXfrm>
-        <a:off x="1974786" y="1196602"/>
-        <a:ext cx="1876661" cy="1595470"/>
+        <a:off x="2052670" y="1274486"/>
+        <a:ext cx="1720893" cy="1439702"/>
       </dsp:txXfrm>
     </dsp:sp>
     <dsp:sp modelId="{8D38DCC3-0AC0-4910-8A46-CDDAB05465F4}">
@@ -1575,8 +1575,8 @@
         </a:p>
       </dsp:txBody>
       <dsp:txXfrm>
-        <a:off x="3945280" y="1196602"/>
-        <a:ext cx="1876661" cy="1595470"/>
+        <a:off x="4023164" y="1274486"/>
+        <a:ext cx="1720893" cy="1439702"/>
       </dsp:txXfrm>
     </dsp:sp>
     <dsp:sp modelId="{9194ED45-4CDD-45D8-B521-B70CF5A2D7F8}">
@@ -1653,8 +1653,8 @@
         </a:p>
       </dsp:txBody>
       <dsp:txXfrm>
-        <a:off x="5915774" y="1196602"/>
-        <a:ext cx="1876661" cy="1595470"/>
+        <a:off x="5993658" y="1274486"/>
+        <a:ext cx="1720893" cy="1439702"/>
       </dsp:txXfrm>
     </dsp:sp>
     <dsp:sp modelId="{C0205760-BE29-40C1-87A9-6551C62F8F16}">
@@ -1731,8 +1731,8 @@
         </a:p>
       </dsp:txBody>
       <dsp:txXfrm>
-        <a:off x="7886268" y="1196602"/>
-        <a:ext cx="1876661" cy="1595470"/>
+        <a:off x="7964152" y="1274486"/>
+        <a:ext cx="1720893" cy="1439702"/>
       </dsp:txXfrm>
     </dsp:sp>
   </dsp:spTree>
@@ -3010,7 +3010,7 @@
             <a:fld id="{347C514D-1D14-408D-B465-EC37EFD988CF}" type="datetimeFigureOut">
               <a:rPr lang="pt-BR" smtClean="0"/>
               <a:pPr/>
-              <a:t>15/2/2016</a:t>
+              <a:t>16/02/16</a:t>
             </a:fld>
             <a:endParaRPr lang="pt-BR"/>
           </a:p>
@@ -3170,7 +3170,7 @@
             <a:fld id="{474DB4FF-4194-4DEE-9728-21F4EDEA0465}" type="slidenum">
               <a:rPr lang="pt-BR" smtClean="0"/>
               <a:pPr/>
-              <a:t>‹nº›</a:t>
+              <a:t>‹#›</a:t>
             </a:fld>
             <a:endParaRPr lang="pt-BR"/>
           </a:p>
@@ -3179,7 +3179,7 @@
     </p:spTree>
     <p:extLst>
       <p:ext uri="{BB962C8B-B14F-4D97-AF65-F5344CB8AC3E}">
-        <p14:creationId xmlns:p14="http://schemas.microsoft.com/office/powerpoint/2010/main" xmlns="" val="2759230732"/>
+        <p14:creationId xmlns:p14="http://schemas.microsoft.com/office/powerpoint/2010/main" val="2759230732"/>
       </p:ext>
     </p:extLst>
   </p:cSld>
@@ -3513,7 +3513,7 @@
     </p:spTree>
     <p:extLst>
       <p:ext uri="{BB962C8B-B14F-4D97-AF65-F5344CB8AC3E}">
-        <p14:creationId xmlns:p14="http://schemas.microsoft.com/office/powerpoint/2010/main" xmlns="" val="921423735"/>
+        <p14:creationId xmlns:p14="http://schemas.microsoft.com/office/powerpoint/2010/main" val="921423735"/>
       </p:ext>
     </p:extLst>
   </p:cSld>
@@ -3757,7 +3757,7 @@
     </p:spTree>
     <p:extLst>
       <p:ext uri="{BB962C8B-B14F-4D97-AF65-F5344CB8AC3E}">
-        <p14:creationId xmlns:p14="http://schemas.microsoft.com/office/powerpoint/2010/main" xmlns="" val="1324179418"/>
+        <p14:creationId xmlns:p14="http://schemas.microsoft.com/office/powerpoint/2010/main" val="1324179418"/>
       </p:ext>
     </p:extLst>
   </p:cSld>
@@ -4001,7 +4001,7 @@
     </p:spTree>
     <p:extLst>
       <p:ext uri="{BB962C8B-B14F-4D97-AF65-F5344CB8AC3E}">
-        <p14:creationId xmlns:p14="http://schemas.microsoft.com/office/powerpoint/2010/main" xmlns="" val="3886547288"/>
+        <p14:creationId xmlns:p14="http://schemas.microsoft.com/office/powerpoint/2010/main" val="3886547288"/>
       </p:ext>
     </p:extLst>
   </p:cSld>
@@ -4245,7 +4245,7 @@
     </p:spTree>
     <p:extLst>
       <p:ext uri="{BB962C8B-B14F-4D97-AF65-F5344CB8AC3E}">
-        <p14:creationId xmlns:p14="http://schemas.microsoft.com/office/powerpoint/2010/main" xmlns="" val="3985380415"/>
+        <p14:creationId xmlns:p14="http://schemas.microsoft.com/office/powerpoint/2010/main" val="3985380415"/>
       </p:ext>
     </p:extLst>
   </p:cSld>
@@ -4489,7 +4489,7 @@
     </p:spTree>
     <p:extLst>
       <p:ext uri="{BB962C8B-B14F-4D97-AF65-F5344CB8AC3E}">
-        <p14:creationId xmlns:p14="http://schemas.microsoft.com/office/powerpoint/2010/main" xmlns="" val="3161393700"/>
+        <p14:creationId xmlns:p14="http://schemas.microsoft.com/office/powerpoint/2010/main" val="3161393700"/>
       </p:ext>
     </p:extLst>
   </p:cSld>
@@ -4538,15 +4538,15 @@
           </a:ln>
           <a:effectLst/>
           <a:extLst>
-            <a:ext uri="{909E8E84-426E-40DD-AFC4-6F175D3DCCD1}">
-              <a14:hiddenFill xmlns:a14="http://schemas.microsoft.com/office/drawing/2010/main" xmlns="">
+            <a:ext uri="{909E8E84-426E-40dd-AFC4-6F175D3DCCD1}">
+              <a14:hiddenFill xmlns:a14="http://schemas.microsoft.com/office/drawing/2010/main">
                 <a:solidFill>
                   <a:schemeClr val="accent1"/>
                 </a:solidFill>
               </a14:hiddenFill>
             </a:ext>
-            <a:ext uri="{91240B29-F687-4F45-9708-019B960494DF}">
-              <a14:hiddenLine xmlns:a14="http://schemas.microsoft.com/office/drawing/2010/main" xmlns="" w="9525">
+            <a:ext uri="{91240B29-F687-4f45-9708-019B960494DF}">
+              <a14:hiddenLine xmlns:a14="http://schemas.microsoft.com/office/drawing/2010/main" w="9525">
                 <a:solidFill>
                   <a:schemeClr val="tx1"/>
                 </a:solidFill>
@@ -4555,8 +4555,8 @@
                 <a:tailEnd/>
               </a14:hiddenLine>
             </a:ext>
-            <a:ext uri="{AF507438-7753-43E0-B8FC-AC1667EBCBE1}">
-              <a14:hiddenEffects xmlns:a14="http://schemas.microsoft.com/office/drawing/2010/main" xmlns="">
+            <a:ext uri="{AF507438-7753-43e0-B8FC-AC1667EBCBE1}">
+              <a14:hiddenEffects xmlns:a14="http://schemas.microsoft.com/office/drawing/2010/main">
                 <a:effectLst>
                   <a:outerShdw dist="35921" dir="2700000" algn="ctr" rotWithShape="0">
                     <a:schemeClr val="bg2"/>
@@ -4819,7 +4819,7 @@
               <a:pPr>
                 <a:defRPr/>
               </a:pPr>
-              <a:t>‹nº›</a:t>
+              <a:t>‹#›</a:t>
             </a:fld>
             <a:endParaRPr lang="en-US" altLang="en-US"/>
           </a:p>
@@ -4828,7 +4828,7 @@
     </p:spTree>
     <p:extLst>
       <p:ext uri="{BB962C8B-B14F-4D97-AF65-F5344CB8AC3E}">
-        <p14:creationId xmlns:p14="http://schemas.microsoft.com/office/powerpoint/2010/main" xmlns="" val="3609638757"/>
+        <p14:creationId xmlns:p14="http://schemas.microsoft.com/office/powerpoint/2010/main" val="3609638757"/>
       </p:ext>
     </p:extLst>
   </p:cSld>
@@ -5015,7 +5015,7 @@
               <a:pPr>
                 <a:defRPr/>
               </a:pPr>
-              <a:t>‹nº›</a:t>
+              <a:t>‹#›</a:t>
             </a:fld>
             <a:endParaRPr lang="en-US" altLang="en-US"/>
           </a:p>
@@ -5024,7 +5024,7 @@
     </p:spTree>
     <p:extLst>
       <p:ext uri="{BB962C8B-B14F-4D97-AF65-F5344CB8AC3E}">
-        <p14:creationId xmlns:p14="http://schemas.microsoft.com/office/powerpoint/2010/main" xmlns="" val="3797568057"/>
+        <p14:creationId xmlns:p14="http://schemas.microsoft.com/office/powerpoint/2010/main" val="3797568057"/>
       </p:ext>
     </p:extLst>
   </p:cSld>
@@ -5221,7 +5221,7 @@
               <a:pPr>
                 <a:defRPr/>
               </a:pPr>
-              <a:t>‹nº›</a:t>
+              <a:t>‹#›</a:t>
             </a:fld>
             <a:endParaRPr lang="en-US" altLang="en-US"/>
           </a:p>
@@ -5230,7 +5230,7 @@
     </p:spTree>
     <p:extLst>
       <p:ext uri="{BB962C8B-B14F-4D97-AF65-F5344CB8AC3E}">
-        <p14:creationId xmlns:p14="http://schemas.microsoft.com/office/powerpoint/2010/main" xmlns="" val="4097588366"/>
+        <p14:creationId xmlns:p14="http://schemas.microsoft.com/office/powerpoint/2010/main" val="4097588366"/>
       </p:ext>
     </p:extLst>
   </p:cSld>
@@ -5395,7 +5395,7 @@
               <a:pPr>
                 <a:defRPr/>
               </a:pPr>
-              <a:t>‹nº›</a:t>
+              <a:t>‹#›</a:t>
             </a:fld>
             <a:endParaRPr lang="en-US" altLang="en-US"/>
           </a:p>
@@ -5404,7 +5404,7 @@
     </p:spTree>
     <p:extLst>
       <p:ext uri="{BB962C8B-B14F-4D97-AF65-F5344CB8AC3E}">
-        <p14:creationId xmlns:p14="http://schemas.microsoft.com/office/powerpoint/2010/main" xmlns="" val="2619340813"/>
+        <p14:creationId xmlns:p14="http://schemas.microsoft.com/office/powerpoint/2010/main" val="2619340813"/>
       </p:ext>
     </p:extLst>
   </p:cSld>
@@ -5658,7 +5658,7 @@
               <a:pPr>
                 <a:defRPr/>
               </a:pPr>
-              <a:t>‹nº›</a:t>
+              <a:t>‹#›</a:t>
             </a:fld>
             <a:endParaRPr lang="en-US" altLang="en-US"/>
           </a:p>
@@ -5667,7 +5667,7 @@
     </p:spTree>
     <p:extLst>
       <p:ext uri="{BB962C8B-B14F-4D97-AF65-F5344CB8AC3E}">
-        <p14:creationId xmlns:p14="http://schemas.microsoft.com/office/powerpoint/2010/main" xmlns="" val="1553314564"/>
+        <p14:creationId xmlns:p14="http://schemas.microsoft.com/office/powerpoint/2010/main" val="1553314564"/>
       </p:ext>
     </p:extLst>
   </p:cSld>
@@ -5872,7 +5872,7 @@
           <a:p>
             <a:fld id="{EE9AA643-A44D-4BF4-8521-FD5A4D8F2AF0}" type="datetimeFigureOut">
               <a:rPr lang="en-US" smtClean="0"/>
-              <a:t>2/15/2016</a:t>
+              <a:t>16/02/16</a:t>
             </a:fld>
             <a:endParaRPr lang="en-US"/>
           </a:p>
@@ -5930,7 +5930,7 @@
           <a:p>
             <a:fld id="{6489A335-20A0-4B33-AF47-5F38777C366C}" type="slidenum">
               <a:rPr lang="en-US" smtClean="0"/>
-              <a:t>‹nº›</a:t>
+              <a:t>‹#›</a:t>
             </a:fld>
             <a:endParaRPr lang="en-US"/>
           </a:p>
@@ -6077,7 +6077,7 @@
           <a:p>
             <a:fld id="{EE9AA643-A44D-4BF4-8521-FD5A4D8F2AF0}" type="datetimeFigureOut">
               <a:rPr lang="en-US" smtClean="0"/>
-              <a:t>2/15/2016</a:t>
+              <a:t>16/02/16</a:t>
             </a:fld>
             <a:endParaRPr lang="en-US"/>
           </a:p>
@@ -6135,7 +6135,7 @@
           <a:p>
             <a:fld id="{6489A335-20A0-4B33-AF47-5F38777C366C}" type="slidenum">
               <a:rPr lang="en-US" smtClean="0"/>
-              <a:t>‹nº›</a:t>
+              <a:t>‹#›</a:t>
             </a:fld>
             <a:endParaRPr lang="en-US"/>
           </a:p>
@@ -6348,7 +6348,7 @@
           <a:p>
             <a:fld id="{EE9AA643-A44D-4BF4-8521-FD5A4D8F2AF0}" type="datetimeFigureOut">
               <a:rPr lang="en-US" smtClean="0"/>
-              <a:t>2/15/2016</a:t>
+              <a:t>16/02/16</a:t>
             </a:fld>
             <a:endParaRPr lang="en-US"/>
           </a:p>
@@ -6406,7 +6406,7 @@
           <a:p>
             <a:fld id="{6489A335-20A0-4B33-AF47-5F38777C366C}" type="slidenum">
               <a:rPr lang="en-US" smtClean="0"/>
-              <a:t>‹nº›</a:t>
+              <a:t>‹#›</a:t>
             </a:fld>
             <a:endParaRPr lang="en-US"/>
           </a:p>
@@ -6669,7 +6669,7 @@
           <a:p>
             <a:fld id="{EE9AA643-A44D-4BF4-8521-FD5A4D8F2AF0}" type="datetimeFigureOut">
               <a:rPr lang="en-US" smtClean="0"/>
-              <a:t>2/15/2016</a:t>
+              <a:t>16/02/16</a:t>
             </a:fld>
             <a:endParaRPr lang="en-US"/>
           </a:p>
@@ -6727,7 +6727,7 @@
           <a:p>
             <a:fld id="{6489A335-20A0-4B33-AF47-5F38777C366C}" type="slidenum">
               <a:rPr lang="en-US" smtClean="0"/>
-              <a:t>‹nº›</a:t>
+              <a:t>‹#›</a:t>
             </a:fld>
             <a:endParaRPr lang="en-US"/>
           </a:p>
@@ -7130,7 +7130,7 @@
           <a:p>
             <a:fld id="{EE9AA643-A44D-4BF4-8521-FD5A4D8F2AF0}" type="datetimeFigureOut">
               <a:rPr lang="en-US" smtClean="0"/>
-              <a:t>2/15/2016</a:t>
+              <a:t>16/02/16</a:t>
             </a:fld>
             <a:endParaRPr lang="en-US"/>
           </a:p>
@@ -7188,7 +7188,7 @@
           <a:p>
             <a:fld id="{6489A335-20A0-4B33-AF47-5F38777C366C}" type="slidenum">
               <a:rPr lang="en-US" smtClean="0"/>
-              <a:t>‹nº›</a:t>
+              <a:t>‹#›</a:t>
             </a:fld>
             <a:endParaRPr lang="en-US"/>
           </a:p>
@@ -7275,7 +7275,7 @@
           <a:p>
             <a:fld id="{EE9AA643-A44D-4BF4-8521-FD5A4D8F2AF0}" type="datetimeFigureOut">
               <a:rPr lang="en-US" smtClean="0"/>
-              <a:t>2/15/2016</a:t>
+              <a:t>16/02/16</a:t>
             </a:fld>
             <a:endParaRPr lang="en-US"/>
           </a:p>
@@ -7333,7 +7333,7 @@
           <a:p>
             <a:fld id="{6489A335-20A0-4B33-AF47-5F38777C366C}" type="slidenum">
               <a:rPr lang="en-US" smtClean="0"/>
-              <a:t>‹nº›</a:t>
+              <a:t>‹#›</a:t>
             </a:fld>
             <a:endParaRPr lang="en-US"/>
           </a:p>
@@ -7524,7 +7524,7 @@
               <a:pPr>
                 <a:defRPr/>
               </a:pPr>
-              <a:t>‹nº›</a:t>
+              <a:t>‹#›</a:t>
             </a:fld>
             <a:endParaRPr lang="en-US" altLang="en-US"/>
           </a:p>
@@ -7533,7 +7533,7 @@
     </p:spTree>
     <p:extLst>
       <p:ext uri="{BB962C8B-B14F-4D97-AF65-F5344CB8AC3E}">
-        <p14:creationId xmlns:p14="http://schemas.microsoft.com/office/powerpoint/2010/main" xmlns="" val="3863314366"/>
+        <p14:creationId xmlns:p14="http://schemas.microsoft.com/office/powerpoint/2010/main" val="3863314366"/>
       </p:ext>
     </p:extLst>
   </p:cSld>
@@ -7585,7 +7585,7 @@
           <a:p>
             <a:fld id="{EE9AA643-A44D-4BF4-8521-FD5A4D8F2AF0}" type="datetimeFigureOut">
               <a:rPr lang="en-US" smtClean="0"/>
-              <a:t>2/15/2016</a:t>
+              <a:t>16/02/16</a:t>
             </a:fld>
             <a:endParaRPr lang="en-US"/>
           </a:p>
@@ -7643,7 +7643,7 @@
           <a:p>
             <a:fld id="{6489A335-20A0-4B33-AF47-5F38777C366C}" type="slidenum">
               <a:rPr lang="en-US" smtClean="0"/>
-              <a:t>‹nº›</a:t>
+              <a:t>‹#›</a:t>
             </a:fld>
             <a:endParaRPr lang="en-US"/>
           </a:p>
@@ -7890,7 +7890,7 @@
           <a:p>
             <a:fld id="{EE9AA643-A44D-4BF4-8521-FD5A4D8F2AF0}" type="datetimeFigureOut">
               <a:rPr lang="en-US" smtClean="0"/>
-              <a:t>2/15/2016</a:t>
+              <a:t>16/02/16</a:t>
             </a:fld>
             <a:endParaRPr lang="en-US"/>
           </a:p>
@@ -7948,7 +7948,7 @@
           <a:p>
             <a:fld id="{6489A335-20A0-4B33-AF47-5F38777C366C}" type="slidenum">
               <a:rPr lang="en-US" smtClean="0"/>
-              <a:t>‹nº›</a:t>
+              <a:t>‹#›</a:t>
             </a:fld>
             <a:endParaRPr lang="en-US"/>
           </a:p>
@@ -8171,7 +8171,7 @@
           <a:p>
             <a:fld id="{EE9AA643-A44D-4BF4-8521-FD5A4D8F2AF0}" type="datetimeFigureOut">
               <a:rPr lang="en-US" smtClean="0"/>
-              <a:t>2/15/2016</a:t>
+              <a:t>16/02/16</a:t>
             </a:fld>
             <a:endParaRPr lang="en-US"/>
           </a:p>
@@ -8229,7 +8229,7 @@
           <a:p>
             <a:fld id="{6489A335-20A0-4B33-AF47-5F38777C366C}" type="slidenum">
               <a:rPr lang="en-US" smtClean="0"/>
-              <a:t>‹nº›</a:t>
+              <a:t>‹#›</a:t>
             </a:fld>
             <a:endParaRPr lang="en-US"/>
           </a:p>
@@ -8376,7 +8376,7 @@
           <a:p>
             <a:fld id="{EE9AA643-A44D-4BF4-8521-FD5A4D8F2AF0}" type="datetimeFigureOut">
               <a:rPr lang="en-US" smtClean="0"/>
-              <a:t>2/15/2016</a:t>
+              <a:t>16/02/16</a:t>
             </a:fld>
             <a:endParaRPr lang="en-US"/>
           </a:p>
@@ -8434,7 +8434,7 @@
           <a:p>
             <a:fld id="{6489A335-20A0-4B33-AF47-5F38777C366C}" type="slidenum">
               <a:rPr lang="en-US" smtClean="0"/>
-              <a:t>‹nº›</a:t>
+              <a:t>‹#›</a:t>
             </a:fld>
             <a:endParaRPr lang="en-US"/>
           </a:p>
@@ -8581,7 +8581,7 @@
           <a:p>
             <a:fld id="{EE9AA643-A44D-4BF4-8521-FD5A4D8F2AF0}" type="datetimeFigureOut">
               <a:rPr lang="en-US" smtClean="0"/>
-              <a:t>2/15/2016</a:t>
+              <a:t>16/02/16</a:t>
             </a:fld>
             <a:endParaRPr lang="en-US"/>
           </a:p>
@@ -8639,7 +8639,7 @@
           <a:p>
             <a:fld id="{6489A335-20A0-4B33-AF47-5F38777C366C}" type="slidenum">
               <a:rPr lang="en-US" smtClean="0"/>
-              <a:t>‹nº›</a:t>
+              <a:t>‹#›</a:t>
             </a:fld>
             <a:endParaRPr lang="en-US"/>
           </a:p>
@@ -8852,7 +8852,7 @@
               <a:pPr>
                 <a:defRPr/>
               </a:pPr>
-              <a:t>‹nº›</a:t>
+              <a:t>‹#›</a:t>
             </a:fld>
             <a:endParaRPr lang="en-US" altLang="en-US"/>
           </a:p>
@@ -8861,7 +8861,7 @@
     </p:spTree>
     <p:extLst>
       <p:ext uri="{BB962C8B-B14F-4D97-AF65-F5344CB8AC3E}">
-        <p14:creationId xmlns:p14="http://schemas.microsoft.com/office/powerpoint/2010/main" xmlns="" val="3089154402"/>
+        <p14:creationId xmlns:p14="http://schemas.microsoft.com/office/powerpoint/2010/main" val="3089154402"/>
       </p:ext>
     </p:extLst>
   </p:cSld>
@@ -9110,7 +9110,7 @@
               <a:pPr>
                 <a:defRPr/>
               </a:pPr>
-              <a:t>‹nº›</a:t>
+              <a:t>‹#›</a:t>
             </a:fld>
             <a:endParaRPr lang="en-US" altLang="en-US"/>
           </a:p>
@@ -9119,7 +9119,7 @@
     </p:spTree>
     <p:extLst>
       <p:ext uri="{BB962C8B-B14F-4D97-AF65-F5344CB8AC3E}">
-        <p14:creationId xmlns:p14="http://schemas.microsoft.com/office/powerpoint/2010/main" xmlns="" val="4217104739"/>
+        <p14:creationId xmlns:p14="http://schemas.microsoft.com/office/powerpoint/2010/main" val="4217104739"/>
       </p:ext>
     </p:extLst>
   </p:cSld>
@@ -9503,7 +9503,7 @@
               <a:pPr>
                 <a:defRPr/>
               </a:pPr>
-              <a:t>‹nº›</a:t>
+              <a:t>‹#›</a:t>
             </a:fld>
             <a:endParaRPr lang="en-US" altLang="en-US"/>
           </a:p>
@@ -9512,7 +9512,7 @@
     </p:spTree>
     <p:extLst>
       <p:ext uri="{BB962C8B-B14F-4D97-AF65-F5344CB8AC3E}">
-        <p14:creationId xmlns:p14="http://schemas.microsoft.com/office/powerpoint/2010/main" xmlns="" val="3451409337"/>
+        <p14:creationId xmlns:p14="http://schemas.microsoft.com/office/powerpoint/2010/main" val="3451409337"/>
       </p:ext>
     </p:extLst>
   </p:cSld>
@@ -9647,7 +9647,7 @@
               <a:pPr>
                 <a:defRPr/>
               </a:pPr>
-              <a:t>‹nº›</a:t>
+              <a:t>‹#›</a:t>
             </a:fld>
             <a:endParaRPr lang="en-US" altLang="en-US"/>
           </a:p>
@@ -9656,7 +9656,7 @@
     </p:spTree>
     <p:extLst>
       <p:ext uri="{BB962C8B-B14F-4D97-AF65-F5344CB8AC3E}">
-        <p14:creationId xmlns:p14="http://schemas.microsoft.com/office/powerpoint/2010/main" xmlns="" val="911935221"/>
+        <p14:creationId xmlns:p14="http://schemas.microsoft.com/office/powerpoint/2010/main" val="911935221"/>
       </p:ext>
     </p:extLst>
   </p:cSld>
@@ -9768,7 +9768,7 @@
               <a:pPr>
                 <a:defRPr/>
               </a:pPr>
-              <a:t>‹nº›</a:t>
+              <a:t>‹#›</a:t>
             </a:fld>
             <a:endParaRPr lang="en-US" altLang="en-US"/>
           </a:p>
@@ -9777,7 +9777,7 @@
     </p:spTree>
     <p:extLst>
       <p:ext uri="{BB962C8B-B14F-4D97-AF65-F5344CB8AC3E}">
-        <p14:creationId xmlns:p14="http://schemas.microsoft.com/office/powerpoint/2010/main" xmlns="" val="1305232693"/>
+        <p14:creationId xmlns:p14="http://schemas.microsoft.com/office/powerpoint/2010/main" val="1305232693"/>
       </p:ext>
     </p:extLst>
   </p:cSld>
@@ -10071,7 +10071,7 @@
               <a:pPr>
                 <a:defRPr/>
               </a:pPr>
-              <a:t>‹nº›</a:t>
+              <a:t>‹#›</a:t>
             </a:fld>
             <a:endParaRPr lang="en-US" altLang="en-US"/>
           </a:p>
@@ -10080,7 +10080,7 @@
     </p:spTree>
     <p:extLst>
       <p:ext uri="{BB962C8B-B14F-4D97-AF65-F5344CB8AC3E}">
-        <p14:creationId xmlns:p14="http://schemas.microsoft.com/office/powerpoint/2010/main" xmlns="" val="109806831"/>
+        <p14:creationId xmlns:p14="http://schemas.microsoft.com/office/powerpoint/2010/main" val="109806831"/>
       </p:ext>
     </p:extLst>
   </p:cSld>
@@ -10351,7 +10351,7 @@
               <a:pPr>
                 <a:defRPr/>
               </a:pPr>
-              <a:t>‹nº›</a:t>
+              <a:t>‹#›</a:t>
             </a:fld>
             <a:endParaRPr lang="en-US" altLang="en-US"/>
           </a:p>
@@ -10360,7 +10360,7 @@
     </p:spTree>
     <p:extLst>
       <p:ext uri="{BB962C8B-B14F-4D97-AF65-F5344CB8AC3E}">
-        <p14:creationId xmlns:p14="http://schemas.microsoft.com/office/powerpoint/2010/main" xmlns="" val="2597479848"/>
+        <p14:creationId xmlns:p14="http://schemas.microsoft.com/office/powerpoint/2010/main" val="2597479848"/>
       </p:ext>
     </p:extLst>
   </p:cSld>
@@ -10419,15 +10419,15 @@
           </a:ln>
           <a:effectLst/>
           <a:extLst>
-            <a:ext uri="{909E8E84-426E-40DD-AFC4-6F175D3DCCD1}">
-              <a14:hiddenFill xmlns:a14="http://schemas.microsoft.com/office/drawing/2010/main" xmlns="">
+            <a:ext uri="{909E8E84-426E-40dd-AFC4-6F175D3DCCD1}">
+              <a14:hiddenFill xmlns:a14="http://schemas.microsoft.com/office/drawing/2010/main">
                 <a:solidFill>
                   <a:schemeClr val="accent1"/>
                 </a:solidFill>
               </a14:hiddenFill>
             </a:ext>
-            <a:ext uri="{91240B29-F687-4F45-9708-019B960494DF}">
-              <a14:hiddenLine xmlns:a14="http://schemas.microsoft.com/office/drawing/2010/main" xmlns="" w="9525">
+            <a:ext uri="{91240B29-F687-4f45-9708-019B960494DF}">
+              <a14:hiddenLine xmlns:a14="http://schemas.microsoft.com/office/drawing/2010/main" w="9525">
                 <a:solidFill>
                   <a:schemeClr val="tx1"/>
                 </a:solidFill>
@@ -10436,8 +10436,8 @@
                 <a:tailEnd/>
               </a14:hiddenLine>
             </a:ext>
-            <a:ext uri="{AF507438-7753-43E0-B8FC-AC1667EBCBE1}">
-              <a14:hiddenEffects xmlns:a14="http://schemas.microsoft.com/office/drawing/2010/main" xmlns="">
+            <a:ext uri="{AF507438-7753-43e0-B8FC-AC1667EBCBE1}">
+              <a14:hiddenEffects xmlns:a14="http://schemas.microsoft.com/office/drawing/2010/main">
                 <a:effectLst>
                   <a:outerShdw dist="35921" dir="2700000" algn="ctr" rotWithShape="0">
                     <a:schemeClr val="bg2"/>
@@ -10487,15 +10487,15 @@
           </a:ln>
           <a:effectLst/>
           <a:extLst>
-            <a:ext uri="{909E8E84-426E-40DD-AFC4-6F175D3DCCD1}">
-              <a14:hiddenFill xmlns:a14="http://schemas.microsoft.com/office/drawing/2010/main" xmlns="">
+            <a:ext uri="{909E8E84-426E-40dd-AFC4-6F175D3DCCD1}">
+              <a14:hiddenFill xmlns:a14="http://schemas.microsoft.com/office/drawing/2010/main">
                 <a:solidFill>
                   <a:schemeClr val="accent1"/>
                 </a:solidFill>
               </a14:hiddenFill>
             </a:ext>
-            <a:ext uri="{91240B29-F687-4F45-9708-019B960494DF}">
-              <a14:hiddenLine xmlns:a14="http://schemas.microsoft.com/office/drawing/2010/main" xmlns="" w="9525">
+            <a:ext uri="{91240B29-F687-4f45-9708-019B960494DF}">
+              <a14:hiddenLine xmlns:a14="http://schemas.microsoft.com/office/drawing/2010/main" w="9525">
                 <a:solidFill>
                   <a:schemeClr val="tx1"/>
                 </a:solidFill>
@@ -10504,8 +10504,8 @@
                 <a:tailEnd/>
               </a14:hiddenLine>
             </a:ext>
-            <a:ext uri="{AF507438-7753-43E0-B8FC-AC1667EBCBE1}">
-              <a14:hiddenEffects xmlns:a14="http://schemas.microsoft.com/office/drawing/2010/main" xmlns="">
+            <a:ext uri="{AF507438-7753-43e0-B8FC-AC1667EBCBE1}">
+              <a14:hiddenEffects xmlns:a14="http://schemas.microsoft.com/office/drawing/2010/main">
                 <a:effectLst>
                   <a:outerShdw dist="35921" dir="2700000" algn="ctr" rotWithShape="0">
                     <a:schemeClr val="bg2"/>
@@ -10583,15 +10583,15 @@
           </a:ln>
           <a:effectLst/>
           <a:extLst>
-            <a:ext uri="{909E8E84-426E-40DD-AFC4-6F175D3DCCD1}">
-              <a14:hiddenFill xmlns:a14="http://schemas.microsoft.com/office/drawing/2010/main" xmlns="">
+            <a:ext uri="{909E8E84-426E-40dd-AFC4-6F175D3DCCD1}">
+              <a14:hiddenFill xmlns:a14="http://schemas.microsoft.com/office/drawing/2010/main">
                 <a:solidFill>
                   <a:schemeClr val="accent1"/>
                 </a:solidFill>
               </a14:hiddenFill>
             </a:ext>
-            <a:ext uri="{91240B29-F687-4F45-9708-019B960494DF}">
-              <a14:hiddenLine xmlns:a14="http://schemas.microsoft.com/office/drawing/2010/main" xmlns="" w="9525">
+            <a:ext uri="{91240B29-F687-4f45-9708-019B960494DF}">
+              <a14:hiddenLine xmlns:a14="http://schemas.microsoft.com/office/drawing/2010/main" w="9525">
                 <a:solidFill>
                   <a:schemeClr val="tx1"/>
                 </a:solidFill>
@@ -10600,8 +10600,8 @@
                 <a:tailEnd/>
               </a14:hiddenLine>
             </a:ext>
-            <a:ext uri="{AF507438-7753-43E0-B8FC-AC1667EBCBE1}">
-              <a14:hiddenEffects xmlns:a14="http://schemas.microsoft.com/office/drawing/2010/main" xmlns="">
+            <a:ext uri="{AF507438-7753-43e0-B8FC-AC1667EBCBE1}">
+              <a14:hiddenEffects xmlns:a14="http://schemas.microsoft.com/office/drawing/2010/main">
                 <a:effectLst>
                   <a:outerShdw dist="35921" dir="2700000" algn="ctr" rotWithShape="0">
                     <a:schemeClr val="bg2"/>
@@ -10654,15 +10654,15 @@
           </a:ln>
           <a:effectLst/>
           <a:extLst>
-            <a:ext uri="{909E8E84-426E-40DD-AFC4-6F175D3DCCD1}">
-              <a14:hiddenFill xmlns:a14="http://schemas.microsoft.com/office/drawing/2010/main" xmlns="">
+            <a:ext uri="{909E8E84-426E-40dd-AFC4-6F175D3DCCD1}">
+              <a14:hiddenFill xmlns:a14="http://schemas.microsoft.com/office/drawing/2010/main">
                 <a:solidFill>
                   <a:schemeClr val="accent1"/>
                 </a:solidFill>
               </a14:hiddenFill>
             </a:ext>
-            <a:ext uri="{91240B29-F687-4F45-9708-019B960494DF}">
-              <a14:hiddenLine xmlns:a14="http://schemas.microsoft.com/office/drawing/2010/main" xmlns="" w="9525">
+            <a:ext uri="{91240B29-F687-4f45-9708-019B960494DF}">
+              <a14:hiddenLine xmlns:a14="http://schemas.microsoft.com/office/drawing/2010/main" w="9525">
                 <a:solidFill>
                   <a:schemeClr val="tx1"/>
                 </a:solidFill>
@@ -10671,8 +10671,8 @@
                 <a:tailEnd/>
               </a14:hiddenLine>
             </a:ext>
-            <a:ext uri="{AF507438-7753-43E0-B8FC-AC1667EBCBE1}">
-              <a14:hiddenEffects xmlns:a14="http://schemas.microsoft.com/office/drawing/2010/main" xmlns="">
+            <a:ext uri="{AF507438-7753-43e0-B8FC-AC1667EBCBE1}">
+              <a14:hiddenEffects xmlns:a14="http://schemas.microsoft.com/office/drawing/2010/main">
                 <a:effectLst>
                   <a:outerShdw dist="35921" dir="2700000" algn="ctr" rotWithShape="0">
                     <a:schemeClr val="bg2"/>
@@ -10725,15 +10725,15 @@
           </a:ln>
           <a:effectLst/>
           <a:extLst>
-            <a:ext uri="{909E8E84-426E-40DD-AFC4-6F175D3DCCD1}">
-              <a14:hiddenFill xmlns:a14="http://schemas.microsoft.com/office/drawing/2010/main" xmlns="">
+            <a:ext uri="{909E8E84-426E-40dd-AFC4-6F175D3DCCD1}">
+              <a14:hiddenFill xmlns:a14="http://schemas.microsoft.com/office/drawing/2010/main">
                 <a:solidFill>
                   <a:schemeClr val="accent1"/>
                 </a:solidFill>
               </a14:hiddenFill>
             </a:ext>
-            <a:ext uri="{91240B29-F687-4F45-9708-019B960494DF}">
-              <a14:hiddenLine xmlns:a14="http://schemas.microsoft.com/office/drawing/2010/main" xmlns="" w="9525">
+            <a:ext uri="{91240B29-F687-4f45-9708-019B960494DF}">
+              <a14:hiddenLine xmlns:a14="http://schemas.microsoft.com/office/drawing/2010/main" w="9525">
                 <a:solidFill>
                   <a:schemeClr val="tx1"/>
                 </a:solidFill>
@@ -10742,8 +10742,8 @@
                 <a:tailEnd/>
               </a14:hiddenLine>
             </a:ext>
-            <a:ext uri="{AF507438-7753-43E0-B8FC-AC1667EBCBE1}">
-              <a14:hiddenEffects xmlns:a14="http://schemas.microsoft.com/office/drawing/2010/main" xmlns="">
+            <a:ext uri="{AF507438-7753-43e0-B8FC-AC1667EBCBE1}">
+              <a14:hiddenEffects xmlns:a14="http://schemas.microsoft.com/office/drawing/2010/main">
                 <a:effectLst>
                   <a:outerShdw dist="35921" dir="2700000" algn="ctr" rotWithShape="0">
                     <a:schemeClr val="bg2"/>
@@ -10773,7 +10773,7 @@
               <a:pPr>
                 <a:defRPr/>
               </a:pPr>
-              <a:t>‹nº›</a:t>
+              <a:t>‹#›</a:t>
             </a:fld>
             <a:endParaRPr lang="en-US" altLang="en-US"/>
           </a:p>
@@ -10782,7 +10782,7 @@
     </p:spTree>
     <p:extLst>
       <p:ext uri="{BB962C8B-B14F-4D97-AF65-F5344CB8AC3E}">
-        <p14:creationId xmlns:p14="http://schemas.microsoft.com/office/powerpoint/2010/main" xmlns="" val="521490216"/>
+        <p14:creationId xmlns:p14="http://schemas.microsoft.com/office/powerpoint/2010/main" val="521490216"/>
       </p:ext>
     </p:extLst>
   </p:cSld>
@@ -11592,13 +11592,20 @@
     </p:spTree>
     <p:extLst>
       <p:ext uri="{BB962C8B-B14F-4D97-AF65-F5344CB8AC3E}">
-        <p14:creationId xmlns:p14="http://schemas.microsoft.com/office/powerpoint/2010/main" xmlns="" val="2094261070"/>
+        <p14:creationId xmlns:p14="http://schemas.microsoft.com/office/powerpoint/2010/main" val="2094261070"/>
       </p:ext>
     </p:extLst>
   </p:cSld>
   <p:clrMapOvr>
     <a:masterClrMapping/>
   </p:clrMapOvr>
+  <p:timing>
+    <p:tnLst>
+      <p:par>
+        <p:cTn xmlns:p14="http://schemas.microsoft.com/office/powerpoint/2010/main" id="1" dur="indefinite" restart="never" nodeType="tmRoot"/>
+      </p:par>
+    </p:tnLst>
+  </p:timing>
 </p:sld>
 </file>
 
@@ -11987,7 +11994,7 @@
     </p:spTree>
     <p:extLst>
       <p:ext uri="{BB962C8B-B14F-4D97-AF65-F5344CB8AC3E}">
-        <p14:creationId xmlns:p14="http://schemas.microsoft.com/office/powerpoint/2010/main" xmlns="" val="557769383"/>
+        <p14:creationId xmlns:p14="http://schemas.microsoft.com/office/powerpoint/2010/main" val="557769383"/>
       </p:ext>
     </p:extLst>
   </p:cSld>
@@ -12026,7 +12033,7 @@
           <a:blip r:embed="rId3" cstate="print">
             <a:extLst>
               <a:ext uri="{28A0092B-C50C-407E-A947-70E740481C1C}">
-                <a14:useLocalDpi xmlns:a14="http://schemas.microsoft.com/office/drawing/2010/main" xmlns="" val="0"/>
+                <a14:useLocalDpi xmlns:a14="http://schemas.microsoft.com/office/drawing/2010/main" val="0"/>
               </a:ext>
             </a:extLst>
           </a:blip>
@@ -12048,15 +12055,15 @@
             <a:noFill/>
           </a:ln>
           <a:extLst>
-            <a:ext uri="{909E8E84-426E-40DD-AFC4-6F175D3DCCD1}">
-              <a14:hiddenFill xmlns:a14="http://schemas.microsoft.com/office/drawing/2010/main" xmlns="">
+            <a:ext uri="{909E8E84-426E-40dd-AFC4-6F175D3DCCD1}">
+              <a14:hiddenFill xmlns:a14="http://schemas.microsoft.com/office/drawing/2010/main">
                 <a:solidFill>
                   <a:srgbClr val="FFFFFF"/>
                 </a:solidFill>
               </a14:hiddenFill>
             </a:ext>
-            <a:ext uri="{91240B29-F687-4F45-9708-019B960494DF}">
-              <a14:hiddenLine xmlns:a14="http://schemas.microsoft.com/office/drawing/2010/main" xmlns="" w="9525">
+            <a:ext uri="{91240B29-F687-4f45-9708-019B960494DF}">
+              <a14:hiddenLine xmlns:a14="http://schemas.microsoft.com/office/drawing/2010/main" w="9525">
                 <a:solidFill>
                   <a:srgbClr val="000000"/>
                 </a:solidFill>
@@ -12080,7 +12087,7 @@
           <a:blip r:embed="rId4" cstate="print">
             <a:extLst>
               <a:ext uri="{28A0092B-C50C-407E-A947-70E740481C1C}">
-                <a14:useLocalDpi xmlns:a14="http://schemas.microsoft.com/office/drawing/2010/main" xmlns="" val="0"/>
+                <a14:useLocalDpi xmlns:a14="http://schemas.microsoft.com/office/drawing/2010/main" val="0"/>
               </a:ext>
             </a:extLst>
           </a:blip>
@@ -12102,15 +12109,15 @@
             <a:noFill/>
           </a:ln>
           <a:extLst>
-            <a:ext uri="{909E8E84-426E-40DD-AFC4-6F175D3DCCD1}">
-              <a14:hiddenFill xmlns:a14="http://schemas.microsoft.com/office/drawing/2010/main" xmlns="">
+            <a:ext uri="{909E8E84-426E-40dd-AFC4-6F175D3DCCD1}">
+              <a14:hiddenFill xmlns:a14="http://schemas.microsoft.com/office/drawing/2010/main">
                 <a:solidFill>
                   <a:srgbClr val="FFFFFF"/>
                 </a:solidFill>
               </a14:hiddenFill>
             </a:ext>
-            <a:ext uri="{91240B29-F687-4F45-9708-019B960494DF}">
-              <a14:hiddenLine xmlns:a14="http://schemas.microsoft.com/office/drawing/2010/main" xmlns="" w="9525">
+            <a:ext uri="{91240B29-F687-4f45-9708-019B960494DF}">
+              <a14:hiddenLine xmlns:a14="http://schemas.microsoft.com/office/drawing/2010/main" w="9525">
                 <a:solidFill>
                   <a:srgbClr val="000000"/>
                 </a:solidFill>
@@ -12134,7 +12141,7 @@
           <a:blip r:embed="rId5" cstate="print">
             <a:extLst>
               <a:ext uri="{28A0092B-C50C-407E-A947-70E740481C1C}">
-                <a14:useLocalDpi xmlns:a14="http://schemas.microsoft.com/office/drawing/2010/main" xmlns="" val="0"/>
+                <a14:useLocalDpi xmlns:a14="http://schemas.microsoft.com/office/drawing/2010/main" val="0"/>
               </a:ext>
             </a:extLst>
           </a:blip>
@@ -12156,15 +12163,15 @@
             <a:noFill/>
           </a:ln>
           <a:extLst>
-            <a:ext uri="{909E8E84-426E-40DD-AFC4-6F175D3DCCD1}">
-              <a14:hiddenFill xmlns:a14="http://schemas.microsoft.com/office/drawing/2010/main" xmlns="">
+            <a:ext uri="{909E8E84-426E-40dd-AFC4-6F175D3DCCD1}">
+              <a14:hiddenFill xmlns:a14="http://schemas.microsoft.com/office/drawing/2010/main">
                 <a:solidFill>
                   <a:srgbClr val="FFFFFF"/>
                 </a:solidFill>
               </a14:hiddenFill>
             </a:ext>
-            <a:ext uri="{91240B29-F687-4F45-9708-019B960494DF}">
-              <a14:hiddenLine xmlns:a14="http://schemas.microsoft.com/office/drawing/2010/main" xmlns="" w="9525">
+            <a:ext uri="{91240B29-F687-4f45-9708-019B960494DF}">
+              <a14:hiddenLine xmlns:a14="http://schemas.microsoft.com/office/drawing/2010/main" w="9525">
                 <a:solidFill>
                   <a:srgbClr val="000000"/>
                 </a:solidFill>
@@ -12188,7 +12195,7 @@
           <a:blip r:embed="rId6" cstate="print">
             <a:extLst>
               <a:ext uri="{28A0092B-C50C-407E-A947-70E740481C1C}">
-                <a14:useLocalDpi xmlns:a14="http://schemas.microsoft.com/office/drawing/2010/main" xmlns="" val="0"/>
+                <a14:useLocalDpi xmlns:a14="http://schemas.microsoft.com/office/drawing/2010/main" val="0"/>
               </a:ext>
             </a:extLst>
           </a:blip>
@@ -12210,15 +12217,15 @@
             <a:noFill/>
           </a:ln>
           <a:extLst>
-            <a:ext uri="{909E8E84-426E-40DD-AFC4-6F175D3DCCD1}">
-              <a14:hiddenFill xmlns:a14="http://schemas.microsoft.com/office/drawing/2010/main" xmlns="">
+            <a:ext uri="{909E8E84-426E-40dd-AFC4-6F175D3DCCD1}">
+              <a14:hiddenFill xmlns:a14="http://schemas.microsoft.com/office/drawing/2010/main">
                 <a:solidFill>
                   <a:srgbClr val="FFFFFF"/>
                 </a:solidFill>
               </a14:hiddenFill>
             </a:ext>
-            <a:ext uri="{91240B29-F687-4F45-9708-019B960494DF}">
-              <a14:hiddenLine xmlns:a14="http://schemas.microsoft.com/office/drawing/2010/main" xmlns="" w="9525">
+            <a:ext uri="{91240B29-F687-4f45-9708-019B960494DF}">
+              <a14:hiddenLine xmlns:a14="http://schemas.microsoft.com/office/drawing/2010/main" w="9525">
                 <a:solidFill>
                   <a:srgbClr val="000000"/>
                 </a:solidFill>
@@ -12252,15 +12259,15 @@
           </a:ln>
           <a:effectLst/>
           <a:extLst>
-            <a:ext uri="{909E8E84-426E-40DD-AFC4-6F175D3DCCD1}">
-              <a14:hiddenFill xmlns:a14="http://schemas.microsoft.com/office/drawing/2010/main" xmlns="">
+            <a:ext uri="{909E8E84-426E-40dd-AFC4-6F175D3DCCD1}">
+              <a14:hiddenFill xmlns:a14="http://schemas.microsoft.com/office/drawing/2010/main">
                 <a:solidFill>
                   <a:schemeClr val="accent1"/>
                 </a:solidFill>
               </a14:hiddenFill>
             </a:ext>
-            <a:ext uri="{91240B29-F687-4F45-9708-019B960494DF}">
-              <a14:hiddenLine xmlns:a14="http://schemas.microsoft.com/office/drawing/2010/main" xmlns="" w="9525">
+            <a:ext uri="{91240B29-F687-4f45-9708-019B960494DF}">
+              <a14:hiddenLine xmlns:a14="http://schemas.microsoft.com/office/drawing/2010/main" w="9525">
                 <a:solidFill>
                   <a:schemeClr val="tx1"/>
                 </a:solidFill>
@@ -12269,8 +12276,8 @@
                 <a:tailEnd/>
               </a14:hiddenLine>
             </a:ext>
-            <a:ext uri="{AF507438-7753-43E0-B8FC-AC1667EBCBE1}">
-              <a14:hiddenEffects xmlns:a14="http://schemas.microsoft.com/office/drawing/2010/main" xmlns="">
+            <a:ext uri="{AF507438-7753-43e0-B8FC-AC1667EBCBE1}">
+              <a14:hiddenEffects xmlns:a14="http://schemas.microsoft.com/office/drawing/2010/main">
                 <a:effectLst>
                   <a:outerShdw dist="35921" dir="2700000" algn="ctr" rotWithShape="0">
                     <a:schemeClr val="bg2"/>
@@ -12412,7 +12419,7 @@
           <a:blip r:embed="rId7" cstate="print">
             <a:extLst>
               <a:ext uri="{28A0092B-C50C-407E-A947-70E740481C1C}">
-                <a14:useLocalDpi xmlns:a14="http://schemas.microsoft.com/office/drawing/2010/main" xmlns="" val="0"/>
+                <a14:useLocalDpi xmlns:a14="http://schemas.microsoft.com/office/drawing/2010/main" val="0"/>
               </a:ext>
             </a:extLst>
           </a:blip>
@@ -12434,15 +12441,15 @@
             <a:noFill/>
           </a:ln>
           <a:extLst>
-            <a:ext uri="{909E8E84-426E-40DD-AFC4-6F175D3DCCD1}">
-              <a14:hiddenFill xmlns:a14="http://schemas.microsoft.com/office/drawing/2010/main" xmlns="">
+            <a:ext uri="{909E8E84-426E-40dd-AFC4-6F175D3DCCD1}">
+              <a14:hiddenFill xmlns:a14="http://schemas.microsoft.com/office/drawing/2010/main">
                 <a:solidFill>
                   <a:srgbClr val="FFFFFF"/>
                 </a:solidFill>
               </a14:hiddenFill>
             </a:ext>
-            <a:ext uri="{91240B29-F687-4F45-9708-019B960494DF}">
-              <a14:hiddenLine xmlns:a14="http://schemas.microsoft.com/office/drawing/2010/main" xmlns="" w="9525">
+            <a:ext uri="{91240B29-F687-4f45-9708-019B960494DF}">
+              <a14:hiddenLine xmlns:a14="http://schemas.microsoft.com/office/drawing/2010/main" w="9525">
                 <a:solidFill>
                   <a:srgbClr val="000000"/>
                 </a:solidFill>
@@ -12476,15 +12483,15 @@
           </a:ln>
           <a:effectLst/>
           <a:extLst>
-            <a:ext uri="{909E8E84-426E-40DD-AFC4-6F175D3DCCD1}">
-              <a14:hiddenFill xmlns:a14="http://schemas.microsoft.com/office/drawing/2010/main" xmlns="">
+            <a:ext uri="{909E8E84-426E-40dd-AFC4-6F175D3DCCD1}">
+              <a14:hiddenFill xmlns:a14="http://schemas.microsoft.com/office/drawing/2010/main">
                 <a:solidFill>
                   <a:schemeClr val="accent1"/>
                 </a:solidFill>
               </a14:hiddenFill>
             </a:ext>
-            <a:ext uri="{91240B29-F687-4F45-9708-019B960494DF}">
-              <a14:hiddenLine xmlns:a14="http://schemas.microsoft.com/office/drawing/2010/main" xmlns="" w="9525">
+            <a:ext uri="{91240B29-F687-4f45-9708-019B960494DF}">
+              <a14:hiddenLine xmlns:a14="http://schemas.microsoft.com/office/drawing/2010/main" w="9525">
                 <a:solidFill>
                   <a:schemeClr val="tx1"/>
                 </a:solidFill>
@@ -12493,8 +12500,8 @@
                 <a:tailEnd/>
               </a14:hiddenLine>
             </a:ext>
-            <a:ext uri="{AF507438-7753-43E0-B8FC-AC1667EBCBE1}">
-              <a14:hiddenEffects xmlns:a14="http://schemas.microsoft.com/office/drawing/2010/main" xmlns="">
+            <a:ext uri="{AF507438-7753-43e0-B8FC-AC1667EBCBE1}">
+              <a14:hiddenEffects xmlns:a14="http://schemas.microsoft.com/office/drawing/2010/main">
                 <a:effectLst>
                   <a:outerShdw dist="35921" dir="2700000" algn="ctr" rotWithShape="0">
                     <a:schemeClr val="bg2"/>
@@ -12785,14 +12792,14 @@
     </p:spTree>
     <p:extLst>
       <p:ext uri="{BB962C8B-B14F-4D97-AF65-F5344CB8AC3E}">
-        <p14:creationId xmlns:p14="http://schemas.microsoft.com/office/powerpoint/2010/main" xmlns="" val="3100232437"/>
+        <p14:creationId xmlns:p14="http://schemas.microsoft.com/office/powerpoint/2010/main" val="3100232437"/>
       </p:ext>
     </p:extLst>
   </p:cSld>
   <p:clrMapOvr>
     <a:masterClrMapping/>
   </p:clrMapOvr>
-  <p:transition/>
+  <p:transition xmlns:p14="http://schemas.microsoft.com/office/powerpoint/2010/main"/>
 </p:sld>
 </file>
 
@@ -12825,7 +12832,7 @@
           <a:blip r:embed="rId3" cstate="print">
             <a:extLst>
               <a:ext uri="{28A0092B-C50C-407E-A947-70E740481C1C}">
-                <a14:useLocalDpi xmlns:a14="http://schemas.microsoft.com/office/drawing/2010/main" xmlns="" val="0"/>
+                <a14:useLocalDpi xmlns:a14="http://schemas.microsoft.com/office/drawing/2010/main" val="0"/>
               </a:ext>
             </a:extLst>
           </a:blip>
@@ -12847,15 +12854,15 @@
             <a:noFill/>
           </a:ln>
           <a:extLst>
-            <a:ext uri="{909E8E84-426E-40DD-AFC4-6F175D3DCCD1}">
-              <a14:hiddenFill xmlns:a14="http://schemas.microsoft.com/office/drawing/2010/main" xmlns="">
+            <a:ext uri="{909E8E84-426E-40dd-AFC4-6F175D3DCCD1}">
+              <a14:hiddenFill xmlns:a14="http://schemas.microsoft.com/office/drawing/2010/main">
                 <a:solidFill>
                   <a:srgbClr val="FFFFFF"/>
                 </a:solidFill>
               </a14:hiddenFill>
             </a:ext>
-            <a:ext uri="{91240B29-F687-4F45-9708-019B960494DF}">
-              <a14:hiddenLine xmlns:a14="http://schemas.microsoft.com/office/drawing/2010/main" xmlns="" w="9525">
+            <a:ext uri="{91240B29-F687-4f45-9708-019B960494DF}">
+              <a14:hiddenLine xmlns:a14="http://schemas.microsoft.com/office/drawing/2010/main" w="9525">
                 <a:solidFill>
                   <a:srgbClr val="000000"/>
                 </a:solidFill>
@@ -12879,7 +12886,7 @@
           <a:blip r:embed="rId4" cstate="print">
             <a:extLst>
               <a:ext uri="{28A0092B-C50C-407E-A947-70E740481C1C}">
-                <a14:useLocalDpi xmlns:a14="http://schemas.microsoft.com/office/drawing/2010/main" xmlns="" val="0"/>
+                <a14:useLocalDpi xmlns:a14="http://schemas.microsoft.com/office/drawing/2010/main" val="0"/>
               </a:ext>
             </a:extLst>
           </a:blip>
@@ -12901,15 +12908,15 @@
             <a:noFill/>
           </a:ln>
           <a:extLst>
-            <a:ext uri="{909E8E84-426E-40DD-AFC4-6F175D3DCCD1}">
-              <a14:hiddenFill xmlns:a14="http://schemas.microsoft.com/office/drawing/2010/main" xmlns="">
+            <a:ext uri="{909E8E84-426E-40dd-AFC4-6F175D3DCCD1}">
+              <a14:hiddenFill xmlns:a14="http://schemas.microsoft.com/office/drawing/2010/main">
                 <a:solidFill>
                   <a:srgbClr val="FFFFFF"/>
                 </a:solidFill>
               </a14:hiddenFill>
             </a:ext>
-            <a:ext uri="{91240B29-F687-4F45-9708-019B960494DF}">
-              <a14:hiddenLine xmlns:a14="http://schemas.microsoft.com/office/drawing/2010/main" xmlns="" w="9525">
+            <a:ext uri="{91240B29-F687-4f45-9708-019B960494DF}">
+              <a14:hiddenLine xmlns:a14="http://schemas.microsoft.com/office/drawing/2010/main" w="9525">
                 <a:solidFill>
                   <a:srgbClr val="000000"/>
                 </a:solidFill>
@@ -12933,7 +12940,7 @@
           <a:blip r:embed="rId5" cstate="print">
             <a:extLst>
               <a:ext uri="{28A0092B-C50C-407E-A947-70E740481C1C}">
-                <a14:useLocalDpi xmlns:a14="http://schemas.microsoft.com/office/drawing/2010/main" xmlns="" val="0"/>
+                <a14:useLocalDpi xmlns:a14="http://schemas.microsoft.com/office/drawing/2010/main" val="0"/>
               </a:ext>
             </a:extLst>
           </a:blip>
@@ -12955,15 +12962,15 @@
             <a:noFill/>
           </a:ln>
           <a:extLst>
-            <a:ext uri="{909E8E84-426E-40DD-AFC4-6F175D3DCCD1}">
-              <a14:hiddenFill xmlns:a14="http://schemas.microsoft.com/office/drawing/2010/main" xmlns="">
+            <a:ext uri="{909E8E84-426E-40dd-AFC4-6F175D3DCCD1}">
+              <a14:hiddenFill xmlns:a14="http://schemas.microsoft.com/office/drawing/2010/main">
                 <a:solidFill>
                   <a:srgbClr val="FFFFFF"/>
                 </a:solidFill>
               </a14:hiddenFill>
             </a:ext>
-            <a:ext uri="{91240B29-F687-4F45-9708-019B960494DF}">
-              <a14:hiddenLine xmlns:a14="http://schemas.microsoft.com/office/drawing/2010/main" xmlns="" w="9525">
+            <a:ext uri="{91240B29-F687-4f45-9708-019B960494DF}">
+              <a14:hiddenLine xmlns:a14="http://schemas.microsoft.com/office/drawing/2010/main" w="9525">
                 <a:solidFill>
                   <a:srgbClr val="000000"/>
                 </a:solidFill>
@@ -12987,7 +12994,7 @@
           <a:blip r:embed="rId6" cstate="print">
             <a:extLst>
               <a:ext uri="{28A0092B-C50C-407E-A947-70E740481C1C}">
-                <a14:useLocalDpi xmlns:a14="http://schemas.microsoft.com/office/drawing/2010/main" xmlns="" val="0"/>
+                <a14:useLocalDpi xmlns:a14="http://schemas.microsoft.com/office/drawing/2010/main" val="0"/>
               </a:ext>
             </a:extLst>
           </a:blip>
@@ -13009,15 +13016,15 @@
             <a:noFill/>
           </a:ln>
           <a:extLst>
-            <a:ext uri="{909E8E84-426E-40DD-AFC4-6F175D3DCCD1}">
-              <a14:hiddenFill xmlns:a14="http://schemas.microsoft.com/office/drawing/2010/main" xmlns="">
+            <a:ext uri="{909E8E84-426E-40dd-AFC4-6F175D3DCCD1}">
+              <a14:hiddenFill xmlns:a14="http://schemas.microsoft.com/office/drawing/2010/main">
                 <a:solidFill>
                   <a:srgbClr val="FFFFFF"/>
                 </a:solidFill>
               </a14:hiddenFill>
             </a:ext>
-            <a:ext uri="{91240B29-F687-4F45-9708-019B960494DF}">
-              <a14:hiddenLine xmlns:a14="http://schemas.microsoft.com/office/drawing/2010/main" xmlns="" w="9525">
+            <a:ext uri="{91240B29-F687-4f45-9708-019B960494DF}">
+              <a14:hiddenLine xmlns:a14="http://schemas.microsoft.com/office/drawing/2010/main" w="9525">
                 <a:solidFill>
                   <a:srgbClr val="000000"/>
                 </a:solidFill>
@@ -13221,7 +13228,7 @@
           <a:blip r:embed="rId7" cstate="print">
             <a:extLst>
               <a:ext uri="{28A0092B-C50C-407E-A947-70E740481C1C}">
-                <a14:useLocalDpi xmlns:a14="http://schemas.microsoft.com/office/drawing/2010/main" xmlns="" val="0"/>
+                <a14:useLocalDpi xmlns:a14="http://schemas.microsoft.com/office/drawing/2010/main" val="0"/>
               </a:ext>
             </a:extLst>
           </a:blip>
@@ -13243,15 +13250,15 @@
             <a:noFill/>
           </a:ln>
           <a:extLst>
-            <a:ext uri="{909E8E84-426E-40DD-AFC4-6F175D3DCCD1}">
-              <a14:hiddenFill xmlns:a14="http://schemas.microsoft.com/office/drawing/2010/main" xmlns="">
+            <a:ext uri="{909E8E84-426E-40dd-AFC4-6F175D3DCCD1}">
+              <a14:hiddenFill xmlns:a14="http://schemas.microsoft.com/office/drawing/2010/main">
                 <a:solidFill>
                   <a:srgbClr val="FFFFFF"/>
                 </a:solidFill>
               </a14:hiddenFill>
             </a:ext>
-            <a:ext uri="{91240B29-F687-4F45-9708-019B960494DF}">
-              <a14:hiddenLine xmlns:a14="http://schemas.microsoft.com/office/drawing/2010/main" xmlns="" w="9525">
+            <a:ext uri="{91240B29-F687-4f45-9708-019B960494DF}">
+              <a14:hiddenLine xmlns:a14="http://schemas.microsoft.com/office/drawing/2010/main" w="9525">
                 <a:solidFill>
                   <a:srgbClr val="000000"/>
                 </a:solidFill>
@@ -13340,7 +13347,7 @@
     </p:spTree>
     <p:extLst>
       <p:ext uri="{BB962C8B-B14F-4D97-AF65-F5344CB8AC3E}">
-        <p14:creationId xmlns:p14="http://schemas.microsoft.com/office/powerpoint/2010/main" xmlns="" val="83649119"/>
+        <p14:creationId xmlns:p14="http://schemas.microsoft.com/office/powerpoint/2010/main" val="83649119"/>
       </p:ext>
     </p:extLst>
   </p:cSld>
@@ -13379,7 +13386,7 @@
           <a:blip r:embed="rId3" cstate="print">
             <a:extLst>
               <a:ext uri="{28A0092B-C50C-407E-A947-70E740481C1C}">
-                <a14:useLocalDpi xmlns:a14="http://schemas.microsoft.com/office/drawing/2010/main" xmlns="" val="0"/>
+                <a14:useLocalDpi xmlns:a14="http://schemas.microsoft.com/office/drawing/2010/main" val="0"/>
               </a:ext>
             </a:extLst>
           </a:blip>
@@ -13401,15 +13408,15 @@
             <a:noFill/>
           </a:ln>
           <a:extLst>
-            <a:ext uri="{909E8E84-426E-40DD-AFC4-6F175D3DCCD1}">
-              <a14:hiddenFill xmlns:a14="http://schemas.microsoft.com/office/drawing/2010/main" xmlns="">
+            <a:ext uri="{909E8E84-426E-40dd-AFC4-6F175D3DCCD1}">
+              <a14:hiddenFill xmlns:a14="http://schemas.microsoft.com/office/drawing/2010/main">
                 <a:solidFill>
                   <a:srgbClr val="FFFFFF"/>
                 </a:solidFill>
               </a14:hiddenFill>
             </a:ext>
-            <a:ext uri="{91240B29-F687-4F45-9708-019B960494DF}">
-              <a14:hiddenLine xmlns:a14="http://schemas.microsoft.com/office/drawing/2010/main" xmlns="" w="9525">
+            <a:ext uri="{91240B29-F687-4f45-9708-019B960494DF}">
+              <a14:hiddenLine xmlns:a14="http://schemas.microsoft.com/office/drawing/2010/main" w="9525">
                 <a:solidFill>
                   <a:srgbClr val="000000"/>
                 </a:solidFill>
@@ -13433,7 +13440,7 @@
           <a:blip r:embed="rId4" cstate="print">
             <a:extLst>
               <a:ext uri="{28A0092B-C50C-407E-A947-70E740481C1C}">
-                <a14:useLocalDpi xmlns:a14="http://schemas.microsoft.com/office/drawing/2010/main" xmlns="" val="0"/>
+                <a14:useLocalDpi xmlns:a14="http://schemas.microsoft.com/office/drawing/2010/main" val="0"/>
               </a:ext>
             </a:extLst>
           </a:blip>
@@ -13455,15 +13462,15 @@
             <a:noFill/>
           </a:ln>
           <a:extLst>
-            <a:ext uri="{909E8E84-426E-40DD-AFC4-6F175D3DCCD1}">
-              <a14:hiddenFill xmlns:a14="http://schemas.microsoft.com/office/drawing/2010/main" xmlns="">
+            <a:ext uri="{909E8E84-426E-40dd-AFC4-6F175D3DCCD1}">
+              <a14:hiddenFill xmlns:a14="http://schemas.microsoft.com/office/drawing/2010/main">
                 <a:solidFill>
                   <a:srgbClr val="FFFFFF"/>
                 </a:solidFill>
               </a14:hiddenFill>
             </a:ext>
-            <a:ext uri="{91240B29-F687-4F45-9708-019B960494DF}">
-              <a14:hiddenLine xmlns:a14="http://schemas.microsoft.com/office/drawing/2010/main" xmlns="" w="9525">
+            <a:ext uri="{91240B29-F687-4f45-9708-019B960494DF}">
+              <a14:hiddenLine xmlns:a14="http://schemas.microsoft.com/office/drawing/2010/main" w="9525">
                 <a:solidFill>
                   <a:srgbClr val="000000"/>
                 </a:solidFill>
@@ -13487,7 +13494,7 @@
           <a:blip r:embed="rId5" cstate="print">
             <a:extLst>
               <a:ext uri="{28A0092B-C50C-407E-A947-70E740481C1C}">
-                <a14:useLocalDpi xmlns:a14="http://schemas.microsoft.com/office/drawing/2010/main" xmlns="" val="0"/>
+                <a14:useLocalDpi xmlns:a14="http://schemas.microsoft.com/office/drawing/2010/main" val="0"/>
               </a:ext>
             </a:extLst>
           </a:blip>
@@ -13509,15 +13516,15 @@
             <a:noFill/>
           </a:ln>
           <a:extLst>
-            <a:ext uri="{909E8E84-426E-40DD-AFC4-6F175D3DCCD1}">
-              <a14:hiddenFill xmlns:a14="http://schemas.microsoft.com/office/drawing/2010/main" xmlns="">
+            <a:ext uri="{909E8E84-426E-40dd-AFC4-6F175D3DCCD1}">
+              <a14:hiddenFill xmlns:a14="http://schemas.microsoft.com/office/drawing/2010/main">
                 <a:solidFill>
                   <a:srgbClr val="FFFFFF"/>
                 </a:solidFill>
               </a14:hiddenFill>
             </a:ext>
-            <a:ext uri="{91240B29-F687-4F45-9708-019B960494DF}">
-              <a14:hiddenLine xmlns:a14="http://schemas.microsoft.com/office/drawing/2010/main" xmlns="" w="9525">
+            <a:ext uri="{91240B29-F687-4f45-9708-019B960494DF}">
+              <a14:hiddenLine xmlns:a14="http://schemas.microsoft.com/office/drawing/2010/main" w="9525">
                 <a:solidFill>
                   <a:srgbClr val="000000"/>
                 </a:solidFill>
@@ -13541,7 +13548,7 @@
           <a:blip r:embed="rId6" cstate="print">
             <a:extLst>
               <a:ext uri="{28A0092B-C50C-407E-A947-70E740481C1C}">
-                <a14:useLocalDpi xmlns:a14="http://schemas.microsoft.com/office/drawing/2010/main" xmlns="" val="0"/>
+                <a14:useLocalDpi xmlns:a14="http://schemas.microsoft.com/office/drawing/2010/main" val="0"/>
               </a:ext>
             </a:extLst>
           </a:blip>
@@ -13563,15 +13570,15 @@
             <a:noFill/>
           </a:ln>
           <a:extLst>
-            <a:ext uri="{909E8E84-426E-40DD-AFC4-6F175D3DCCD1}">
-              <a14:hiddenFill xmlns:a14="http://schemas.microsoft.com/office/drawing/2010/main" xmlns="">
+            <a:ext uri="{909E8E84-426E-40dd-AFC4-6F175D3DCCD1}">
+              <a14:hiddenFill xmlns:a14="http://schemas.microsoft.com/office/drawing/2010/main">
                 <a:solidFill>
                   <a:srgbClr val="FFFFFF"/>
                 </a:solidFill>
               </a14:hiddenFill>
             </a:ext>
-            <a:ext uri="{91240B29-F687-4F45-9708-019B960494DF}">
-              <a14:hiddenLine xmlns:a14="http://schemas.microsoft.com/office/drawing/2010/main" xmlns="" w="9525">
+            <a:ext uri="{91240B29-F687-4f45-9708-019B960494DF}">
+              <a14:hiddenLine xmlns:a14="http://schemas.microsoft.com/office/drawing/2010/main" w="9525">
                 <a:solidFill>
                   <a:srgbClr val="000000"/>
                 </a:solidFill>
@@ -13595,7 +13602,7 @@
           <a:blip r:embed="rId7" cstate="print">
             <a:extLst>
               <a:ext uri="{28A0092B-C50C-407E-A947-70E740481C1C}">
-                <a14:useLocalDpi xmlns:a14="http://schemas.microsoft.com/office/drawing/2010/main" xmlns="" val="0"/>
+                <a14:useLocalDpi xmlns:a14="http://schemas.microsoft.com/office/drawing/2010/main" val="0"/>
               </a:ext>
             </a:extLst>
           </a:blip>
@@ -13617,15 +13624,15 @@
             <a:noFill/>
           </a:ln>
           <a:extLst>
-            <a:ext uri="{909E8E84-426E-40DD-AFC4-6F175D3DCCD1}">
-              <a14:hiddenFill xmlns:a14="http://schemas.microsoft.com/office/drawing/2010/main" xmlns="">
+            <a:ext uri="{909E8E84-426E-40dd-AFC4-6F175D3DCCD1}">
+              <a14:hiddenFill xmlns:a14="http://schemas.microsoft.com/office/drawing/2010/main">
                 <a:solidFill>
                   <a:srgbClr val="FFFFFF"/>
                 </a:solidFill>
               </a14:hiddenFill>
             </a:ext>
-            <a:ext uri="{91240B29-F687-4F45-9708-019B960494DF}">
-              <a14:hiddenLine xmlns:a14="http://schemas.microsoft.com/office/drawing/2010/main" xmlns="" w="9525">
+            <a:ext uri="{91240B29-F687-4f45-9708-019B960494DF}">
+              <a14:hiddenLine xmlns:a14="http://schemas.microsoft.com/office/drawing/2010/main" w="9525">
                 <a:solidFill>
                   <a:srgbClr val="000000"/>
                 </a:solidFill>
@@ -13962,13 +13969,20 @@
     </p:spTree>
     <p:extLst>
       <p:ext uri="{BB962C8B-B14F-4D97-AF65-F5344CB8AC3E}">
-        <p14:creationId xmlns:p14="http://schemas.microsoft.com/office/powerpoint/2010/main" xmlns="" val="1464590407"/>
+        <p14:creationId xmlns:p14="http://schemas.microsoft.com/office/powerpoint/2010/main" val="1464590407"/>
       </p:ext>
     </p:extLst>
   </p:cSld>
   <p:clrMapOvr>
     <a:masterClrMapping/>
   </p:clrMapOvr>
+  <p:timing>
+    <p:tnLst>
+      <p:par>
+        <p:cTn xmlns:p14="http://schemas.microsoft.com/office/powerpoint/2010/main" id="1" dur="indefinite" restart="never" nodeType="tmRoot"/>
+      </p:par>
+    </p:tnLst>
+  </p:timing>
 </p:sld>
 </file>
 
@@ -14001,7 +14015,7 @@
           <a:blip r:embed="rId3" cstate="print">
             <a:extLst>
               <a:ext uri="{28A0092B-C50C-407E-A947-70E740481C1C}">
-                <a14:useLocalDpi xmlns:a14="http://schemas.microsoft.com/office/drawing/2010/main" xmlns="" val="0"/>
+                <a14:useLocalDpi xmlns:a14="http://schemas.microsoft.com/office/drawing/2010/main" val="0"/>
               </a:ext>
             </a:extLst>
           </a:blip>
@@ -14023,15 +14037,15 @@
             <a:noFill/>
           </a:ln>
           <a:extLst>
-            <a:ext uri="{909E8E84-426E-40DD-AFC4-6F175D3DCCD1}">
-              <a14:hiddenFill xmlns:a14="http://schemas.microsoft.com/office/drawing/2010/main" xmlns="">
+            <a:ext uri="{909E8E84-426E-40dd-AFC4-6F175D3DCCD1}">
+              <a14:hiddenFill xmlns:a14="http://schemas.microsoft.com/office/drawing/2010/main">
                 <a:solidFill>
                   <a:srgbClr val="FFFFFF"/>
                 </a:solidFill>
               </a14:hiddenFill>
             </a:ext>
-            <a:ext uri="{91240B29-F687-4F45-9708-019B960494DF}">
-              <a14:hiddenLine xmlns:a14="http://schemas.microsoft.com/office/drawing/2010/main" xmlns="" w="9525">
+            <a:ext uri="{91240B29-F687-4f45-9708-019B960494DF}">
+              <a14:hiddenLine xmlns:a14="http://schemas.microsoft.com/office/drawing/2010/main" w="9525">
                 <a:solidFill>
                   <a:srgbClr val="000000"/>
                 </a:solidFill>
@@ -14055,7 +14069,7 @@
           <a:blip r:embed="rId4" cstate="print">
             <a:extLst>
               <a:ext uri="{28A0092B-C50C-407E-A947-70E740481C1C}">
-                <a14:useLocalDpi xmlns:a14="http://schemas.microsoft.com/office/drawing/2010/main" xmlns="" val="0"/>
+                <a14:useLocalDpi xmlns:a14="http://schemas.microsoft.com/office/drawing/2010/main" val="0"/>
               </a:ext>
             </a:extLst>
           </a:blip>
@@ -14077,15 +14091,15 @@
             <a:noFill/>
           </a:ln>
           <a:extLst>
-            <a:ext uri="{909E8E84-426E-40DD-AFC4-6F175D3DCCD1}">
-              <a14:hiddenFill xmlns:a14="http://schemas.microsoft.com/office/drawing/2010/main" xmlns="">
+            <a:ext uri="{909E8E84-426E-40dd-AFC4-6F175D3DCCD1}">
+              <a14:hiddenFill xmlns:a14="http://schemas.microsoft.com/office/drawing/2010/main">
                 <a:solidFill>
                   <a:srgbClr val="FFFFFF"/>
                 </a:solidFill>
               </a14:hiddenFill>
             </a:ext>
-            <a:ext uri="{91240B29-F687-4F45-9708-019B960494DF}">
-              <a14:hiddenLine xmlns:a14="http://schemas.microsoft.com/office/drawing/2010/main" xmlns="" w="9525">
+            <a:ext uri="{91240B29-F687-4f45-9708-019B960494DF}">
+              <a14:hiddenLine xmlns:a14="http://schemas.microsoft.com/office/drawing/2010/main" w="9525">
                 <a:solidFill>
                   <a:srgbClr val="000000"/>
                 </a:solidFill>
@@ -14150,7 +14164,7 @@
           <a:blip r:embed="rId4" cstate="print">
             <a:extLst>
               <a:ext uri="{28A0092B-C50C-407E-A947-70E740481C1C}">
-                <a14:useLocalDpi xmlns:a14="http://schemas.microsoft.com/office/drawing/2010/main" xmlns="" val="0"/>
+                <a14:useLocalDpi xmlns:a14="http://schemas.microsoft.com/office/drawing/2010/main" val="0"/>
               </a:ext>
             </a:extLst>
           </a:blip>
@@ -14170,15 +14184,15 @@
             <a:noFill/>
           </a:ln>
           <a:extLst>
-            <a:ext uri="{909E8E84-426E-40DD-AFC4-6F175D3DCCD1}">
-              <a14:hiddenFill xmlns:a14="http://schemas.microsoft.com/office/drawing/2010/main" xmlns="">
+            <a:ext uri="{909E8E84-426E-40dd-AFC4-6F175D3DCCD1}">
+              <a14:hiddenFill xmlns:a14="http://schemas.microsoft.com/office/drawing/2010/main">
                 <a:solidFill>
                   <a:srgbClr val="FFFFFF"/>
                 </a:solidFill>
               </a14:hiddenFill>
             </a:ext>
-            <a:ext uri="{91240B29-F687-4F45-9708-019B960494DF}">
-              <a14:hiddenLine xmlns:a14="http://schemas.microsoft.com/office/drawing/2010/main" xmlns="" w="9525">
+            <a:ext uri="{91240B29-F687-4f45-9708-019B960494DF}">
+              <a14:hiddenLine xmlns:a14="http://schemas.microsoft.com/office/drawing/2010/main" w="9525">
                 <a:solidFill>
                   <a:srgbClr val="000000"/>
                 </a:solidFill>
@@ -14202,7 +14216,7 @@
           <a:blip r:embed="rId5" cstate="print">
             <a:extLst>
               <a:ext uri="{28A0092B-C50C-407E-A947-70E740481C1C}">
-                <a14:useLocalDpi xmlns:a14="http://schemas.microsoft.com/office/drawing/2010/main" xmlns="" val="0"/>
+                <a14:useLocalDpi xmlns:a14="http://schemas.microsoft.com/office/drawing/2010/main" val="0"/>
               </a:ext>
             </a:extLst>
           </a:blip>
@@ -14224,15 +14238,15 @@
             <a:noFill/>
           </a:ln>
           <a:extLst>
-            <a:ext uri="{909E8E84-426E-40DD-AFC4-6F175D3DCCD1}">
-              <a14:hiddenFill xmlns:a14="http://schemas.microsoft.com/office/drawing/2010/main" xmlns="">
+            <a:ext uri="{909E8E84-426E-40dd-AFC4-6F175D3DCCD1}">
+              <a14:hiddenFill xmlns:a14="http://schemas.microsoft.com/office/drawing/2010/main">
                 <a:solidFill>
                   <a:srgbClr val="FFFFFF"/>
                 </a:solidFill>
               </a14:hiddenFill>
             </a:ext>
-            <a:ext uri="{91240B29-F687-4F45-9708-019B960494DF}">
-              <a14:hiddenLine xmlns:a14="http://schemas.microsoft.com/office/drawing/2010/main" xmlns="" w="9525">
+            <a:ext uri="{91240B29-F687-4f45-9708-019B960494DF}">
+              <a14:hiddenLine xmlns:a14="http://schemas.microsoft.com/office/drawing/2010/main" w="9525">
                 <a:solidFill>
                   <a:srgbClr val="000000"/>
                 </a:solidFill>
@@ -14256,7 +14270,7 @@
           <a:blip r:embed="rId6" cstate="print">
             <a:extLst>
               <a:ext uri="{28A0092B-C50C-407E-A947-70E740481C1C}">
-                <a14:useLocalDpi xmlns:a14="http://schemas.microsoft.com/office/drawing/2010/main" xmlns="" val="0"/>
+                <a14:useLocalDpi xmlns:a14="http://schemas.microsoft.com/office/drawing/2010/main" val="0"/>
               </a:ext>
             </a:extLst>
           </a:blip>
@@ -14278,15 +14292,15 @@
             <a:noFill/>
           </a:ln>
           <a:extLst>
-            <a:ext uri="{909E8E84-426E-40DD-AFC4-6F175D3DCCD1}">
-              <a14:hiddenFill xmlns:a14="http://schemas.microsoft.com/office/drawing/2010/main" xmlns="">
+            <a:ext uri="{909E8E84-426E-40dd-AFC4-6F175D3DCCD1}">
+              <a14:hiddenFill xmlns:a14="http://schemas.microsoft.com/office/drawing/2010/main">
                 <a:solidFill>
                   <a:srgbClr val="FFFFFF"/>
                 </a:solidFill>
               </a14:hiddenFill>
             </a:ext>
-            <a:ext uri="{91240B29-F687-4F45-9708-019B960494DF}">
-              <a14:hiddenLine xmlns:a14="http://schemas.microsoft.com/office/drawing/2010/main" xmlns="" w="9525">
+            <a:ext uri="{91240B29-F687-4f45-9708-019B960494DF}">
+              <a14:hiddenLine xmlns:a14="http://schemas.microsoft.com/office/drawing/2010/main" w="9525">
                 <a:solidFill>
                   <a:srgbClr val="000000"/>
                 </a:solidFill>
@@ -14310,7 +14324,7 @@
           <a:blip r:embed="rId7" cstate="print">
             <a:extLst>
               <a:ext uri="{28A0092B-C50C-407E-A947-70E740481C1C}">
-                <a14:useLocalDpi xmlns:a14="http://schemas.microsoft.com/office/drawing/2010/main" xmlns="" val="0"/>
+                <a14:useLocalDpi xmlns:a14="http://schemas.microsoft.com/office/drawing/2010/main" val="0"/>
               </a:ext>
             </a:extLst>
           </a:blip>
@@ -14332,15 +14346,15 @@
             <a:noFill/>
           </a:ln>
           <a:extLst>
-            <a:ext uri="{909E8E84-426E-40DD-AFC4-6F175D3DCCD1}">
-              <a14:hiddenFill xmlns:a14="http://schemas.microsoft.com/office/drawing/2010/main" xmlns="">
+            <a:ext uri="{909E8E84-426E-40dd-AFC4-6F175D3DCCD1}">
+              <a14:hiddenFill xmlns:a14="http://schemas.microsoft.com/office/drawing/2010/main">
                 <a:solidFill>
                   <a:srgbClr val="FFFFFF"/>
                 </a:solidFill>
               </a14:hiddenFill>
             </a:ext>
-            <a:ext uri="{91240B29-F687-4F45-9708-019B960494DF}">
-              <a14:hiddenLine xmlns:a14="http://schemas.microsoft.com/office/drawing/2010/main" xmlns="" w="9525">
+            <a:ext uri="{91240B29-F687-4f45-9708-019B960494DF}">
+              <a14:hiddenLine xmlns:a14="http://schemas.microsoft.com/office/drawing/2010/main" w="9525">
                 <a:solidFill>
                   <a:srgbClr val="000000"/>
                 </a:solidFill>
@@ -14853,13 +14867,20 @@
     </p:spTree>
     <p:extLst>
       <p:ext uri="{BB962C8B-B14F-4D97-AF65-F5344CB8AC3E}">
-        <p14:creationId xmlns:p14="http://schemas.microsoft.com/office/powerpoint/2010/main" xmlns="" val="3638636546"/>
+        <p14:creationId xmlns:p14="http://schemas.microsoft.com/office/powerpoint/2010/main" val="3638636546"/>
       </p:ext>
     </p:extLst>
   </p:cSld>
   <p:clrMapOvr>
     <a:masterClrMapping/>
   </p:clrMapOvr>
+  <p:timing>
+    <p:tnLst>
+      <p:par>
+        <p:cTn xmlns:p14="http://schemas.microsoft.com/office/powerpoint/2010/main" id="1" dur="indefinite" restart="never" nodeType="tmRoot"/>
+      </p:par>
+    </p:tnLst>
+  </p:timing>
 </p:sld>
 </file>
 
@@ -14892,7 +14913,7 @@
           <a:blip r:embed="rId3" cstate="print">
             <a:extLst>
               <a:ext uri="{28A0092B-C50C-407E-A947-70E740481C1C}">
-                <a14:useLocalDpi xmlns:a14="http://schemas.microsoft.com/office/drawing/2010/main" xmlns="" val="0"/>
+                <a14:useLocalDpi xmlns:a14="http://schemas.microsoft.com/office/drawing/2010/main" val="0"/>
               </a:ext>
             </a:extLst>
           </a:blip>
@@ -14914,15 +14935,15 @@
             <a:noFill/>
           </a:ln>
           <a:extLst>
-            <a:ext uri="{909E8E84-426E-40DD-AFC4-6F175D3DCCD1}">
-              <a14:hiddenFill xmlns:a14="http://schemas.microsoft.com/office/drawing/2010/main" xmlns="">
+            <a:ext uri="{909E8E84-426E-40dd-AFC4-6F175D3DCCD1}">
+              <a14:hiddenFill xmlns:a14="http://schemas.microsoft.com/office/drawing/2010/main">
                 <a:solidFill>
                   <a:srgbClr val="FFFFFF"/>
                 </a:solidFill>
               </a14:hiddenFill>
             </a:ext>
-            <a:ext uri="{91240B29-F687-4F45-9708-019B960494DF}">
-              <a14:hiddenLine xmlns:a14="http://schemas.microsoft.com/office/drawing/2010/main" xmlns="" w="9525">
+            <a:ext uri="{91240B29-F687-4f45-9708-019B960494DF}">
+              <a14:hiddenLine xmlns:a14="http://schemas.microsoft.com/office/drawing/2010/main" w="9525">
                 <a:solidFill>
                   <a:srgbClr val="000000"/>
                 </a:solidFill>
@@ -14946,7 +14967,7 @@
           <a:blip r:embed="rId4" cstate="print">
             <a:extLst>
               <a:ext uri="{28A0092B-C50C-407E-A947-70E740481C1C}">
-                <a14:useLocalDpi xmlns:a14="http://schemas.microsoft.com/office/drawing/2010/main" xmlns="" val="0"/>
+                <a14:useLocalDpi xmlns:a14="http://schemas.microsoft.com/office/drawing/2010/main" val="0"/>
               </a:ext>
             </a:extLst>
           </a:blip>
@@ -14968,15 +14989,15 @@
             <a:noFill/>
           </a:ln>
           <a:extLst>
-            <a:ext uri="{909E8E84-426E-40DD-AFC4-6F175D3DCCD1}">
-              <a14:hiddenFill xmlns:a14="http://schemas.microsoft.com/office/drawing/2010/main" xmlns="">
+            <a:ext uri="{909E8E84-426E-40dd-AFC4-6F175D3DCCD1}">
+              <a14:hiddenFill xmlns:a14="http://schemas.microsoft.com/office/drawing/2010/main">
                 <a:solidFill>
                   <a:srgbClr val="FFFFFF"/>
                 </a:solidFill>
               </a14:hiddenFill>
             </a:ext>
-            <a:ext uri="{91240B29-F687-4F45-9708-019B960494DF}">
-              <a14:hiddenLine xmlns:a14="http://schemas.microsoft.com/office/drawing/2010/main" xmlns="" w="9525">
+            <a:ext uri="{91240B29-F687-4f45-9708-019B960494DF}">
+              <a14:hiddenLine xmlns:a14="http://schemas.microsoft.com/office/drawing/2010/main" w="9525">
                 <a:solidFill>
                   <a:srgbClr val="000000"/>
                 </a:solidFill>
@@ -15000,7 +15021,7 @@
           <a:blip r:embed="rId5" cstate="print">
             <a:extLst>
               <a:ext uri="{28A0092B-C50C-407E-A947-70E740481C1C}">
-                <a14:useLocalDpi xmlns:a14="http://schemas.microsoft.com/office/drawing/2010/main" xmlns="" val="0"/>
+                <a14:useLocalDpi xmlns:a14="http://schemas.microsoft.com/office/drawing/2010/main" val="0"/>
               </a:ext>
             </a:extLst>
           </a:blip>
@@ -15022,15 +15043,15 @@
             <a:noFill/>
           </a:ln>
           <a:extLst>
-            <a:ext uri="{909E8E84-426E-40DD-AFC4-6F175D3DCCD1}">
-              <a14:hiddenFill xmlns:a14="http://schemas.microsoft.com/office/drawing/2010/main" xmlns="">
+            <a:ext uri="{909E8E84-426E-40dd-AFC4-6F175D3DCCD1}">
+              <a14:hiddenFill xmlns:a14="http://schemas.microsoft.com/office/drawing/2010/main">
                 <a:solidFill>
                   <a:srgbClr val="FFFFFF"/>
                 </a:solidFill>
               </a14:hiddenFill>
             </a:ext>
-            <a:ext uri="{91240B29-F687-4F45-9708-019B960494DF}">
-              <a14:hiddenLine xmlns:a14="http://schemas.microsoft.com/office/drawing/2010/main" xmlns="" w="9525">
+            <a:ext uri="{91240B29-F687-4f45-9708-019B960494DF}">
+              <a14:hiddenLine xmlns:a14="http://schemas.microsoft.com/office/drawing/2010/main" w="9525">
                 <a:solidFill>
                   <a:srgbClr val="000000"/>
                 </a:solidFill>
@@ -15054,7 +15075,7 @@
           <a:blip r:embed="rId6" cstate="print">
             <a:extLst>
               <a:ext uri="{28A0092B-C50C-407E-A947-70E740481C1C}">
-                <a14:useLocalDpi xmlns:a14="http://schemas.microsoft.com/office/drawing/2010/main" xmlns="" val="0"/>
+                <a14:useLocalDpi xmlns:a14="http://schemas.microsoft.com/office/drawing/2010/main" val="0"/>
               </a:ext>
             </a:extLst>
           </a:blip>
@@ -15076,15 +15097,15 @@
             <a:noFill/>
           </a:ln>
           <a:extLst>
-            <a:ext uri="{909E8E84-426E-40DD-AFC4-6F175D3DCCD1}">
-              <a14:hiddenFill xmlns:a14="http://schemas.microsoft.com/office/drawing/2010/main" xmlns="">
+            <a:ext uri="{909E8E84-426E-40dd-AFC4-6F175D3DCCD1}">
+              <a14:hiddenFill xmlns:a14="http://schemas.microsoft.com/office/drawing/2010/main">
                 <a:solidFill>
                   <a:srgbClr val="FFFFFF"/>
                 </a:solidFill>
               </a14:hiddenFill>
             </a:ext>
-            <a:ext uri="{91240B29-F687-4F45-9708-019B960494DF}">
-              <a14:hiddenLine xmlns:a14="http://schemas.microsoft.com/office/drawing/2010/main" xmlns="" w="9525">
+            <a:ext uri="{91240B29-F687-4f45-9708-019B960494DF}">
+              <a14:hiddenLine xmlns:a14="http://schemas.microsoft.com/office/drawing/2010/main" w="9525">
                 <a:solidFill>
                   <a:srgbClr val="000000"/>
                 </a:solidFill>
@@ -15108,7 +15129,7 @@
           <a:blip r:embed="rId7" cstate="print">
             <a:extLst>
               <a:ext uri="{28A0092B-C50C-407E-A947-70E740481C1C}">
-                <a14:useLocalDpi xmlns:a14="http://schemas.microsoft.com/office/drawing/2010/main" xmlns="" val="0"/>
+                <a14:useLocalDpi xmlns:a14="http://schemas.microsoft.com/office/drawing/2010/main" val="0"/>
               </a:ext>
             </a:extLst>
           </a:blip>
@@ -15130,15 +15151,15 @@
             <a:noFill/>
           </a:ln>
           <a:extLst>
-            <a:ext uri="{909E8E84-426E-40DD-AFC4-6F175D3DCCD1}">
-              <a14:hiddenFill xmlns:a14="http://schemas.microsoft.com/office/drawing/2010/main" xmlns="">
+            <a:ext uri="{909E8E84-426E-40dd-AFC4-6F175D3DCCD1}">
+              <a14:hiddenFill xmlns:a14="http://schemas.microsoft.com/office/drawing/2010/main">
                 <a:solidFill>
                   <a:srgbClr val="FFFFFF"/>
                 </a:solidFill>
               </a14:hiddenFill>
             </a:ext>
-            <a:ext uri="{91240B29-F687-4F45-9708-019B960494DF}">
-              <a14:hiddenLine xmlns:a14="http://schemas.microsoft.com/office/drawing/2010/main" xmlns="" w="9525">
+            <a:ext uri="{91240B29-F687-4f45-9708-019B960494DF}">
+              <a14:hiddenLine xmlns:a14="http://schemas.microsoft.com/office/drawing/2010/main" w="9525">
                 <a:solidFill>
                   <a:srgbClr val="000000"/>
                 </a:solidFill>
@@ -15228,7 +15249,7 @@
           <p:nvPr>
             <p:extLst>
               <p:ext uri="{D42A27DB-BD31-4B8C-83A1-F6EECF244321}">
-                <p14:modId xmlns:p14="http://schemas.microsoft.com/office/powerpoint/2010/main" xmlns="" val="2979196730"/>
+                <p14:modId xmlns:p14="http://schemas.microsoft.com/office/powerpoint/2010/main" val="2979196730"/>
               </p:ext>
             </p:extLst>
           </p:nvPr>
@@ -15246,13 +15267,20 @@
     </p:spTree>
     <p:extLst>
       <p:ext uri="{BB962C8B-B14F-4D97-AF65-F5344CB8AC3E}">
-        <p14:creationId xmlns:p14="http://schemas.microsoft.com/office/powerpoint/2010/main" xmlns="" val="3989646145"/>
+        <p14:creationId xmlns:p14="http://schemas.microsoft.com/office/powerpoint/2010/main" val="3989646145"/>
       </p:ext>
     </p:extLst>
   </p:cSld>
   <p:clrMapOvr>
     <a:masterClrMapping/>
   </p:clrMapOvr>
+  <p:timing>
+    <p:tnLst>
+      <p:par>
+        <p:cTn xmlns:p14="http://schemas.microsoft.com/office/powerpoint/2010/main" id="1" dur="indefinite" restart="never" nodeType="tmRoot"/>
+      </p:par>
+    </p:tnLst>
+  </p:timing>
 </p:sld>
 </file>
 
@@ -15273,6 +15301,66 @@
           <a:chExt cx="0" cy="0"/>
         </a:xfrm>
       </p:grpSpPr>
+      <p:pic>
+        <p:nvPicPr>
+          <p:cNvPr id="2" name="Picture 1" descr="coins-02.png"/>
+          <p:cNvPicPr>
+            <a:picLocks noChangeAspect="1"/>
+          </p:cNvPicPr>
+          <p:nvPr/>
+        </p:nvPicPr>
+        <p:blipFill>
+          <a:blip r:embed="rId2">
+            <a:extLst>
+              <a:ext uri="{28A0092B-C50C-407E-A947-70E740481C1C}">
+                <a14:useLocalDpi xmlns:a14="http://schemas.microsoft.com/office/drawing/2010/main" val="0"/>
+              </a:ext>
+            </a:extLst>
+          </a:blip>
+          <a:stretch>
+            <a:fillRect/>
+          </a:stretch>
+        </p:blipFill>
+        <p:spPr>
+          <a:xfrm>
+            <a:off x="9014883" y="1151465"/>
+            <a:ext cx="1058603" cy="1065345"/>
+          </a:xfrm>
+          <a:prstGeom prst="rect">
+            <a:avLst/>
+          </a:prstGeom>
+        </p:spPr>
+      </p:pic>
+      <p:pic>
+        <p:nvPicPr>
+          <p:cNvPr id="3" name="Picture 2" descr="coins-01.png"/>
+          <p:cNvPicPr>
+            <a:picLocks noChangeAspect="1"/>
+          </p:cNvPicPr>
+          <p:nvPr/>
+        </p:nvPicPr>
+        <p:blipFill>
+          <a:blip r:embed="rId3">
+            <a:extLst>
+              <a:ext uri="{28A0092B-C50C-407E-A947-70E740481C1C}">
+                <a14:useLocalDpi xmlns:a14="http://schemas.microsoft.com/office/drawing/2010/main" val="0"/>
+              </a:ext>
+            </a:extLst>
+          </a:blip>
+          <a:stretch>
+            <a:fillRect/>
+          </a:stretch>
+        </p:blipFill>
+        <p:spPr>
+          <a:xfrm>
+            <a:off x="7118350" y="1158101"/>
+            <a:ext cx="1053456" cy="1060166"/>
+          </a:xfrm>
+          <a:prstGeom prst="rect">
+            <a:avLst/>
+          </a:prstGeom>
+        </p:spPr>
+      </p:pic>
       <p:sp>
         <p:nvSpPr>
           <p:cNvPr id="11" name="CaixaDeTexto 10"/>
@@ -15417,15 +15505,7 @@
           <a:p>
             <a:r>
               <a:rPr lang="pt-BR" sz="2800" b="1" smtClean="0"/>
-              <a:t>Transparência</a:t>
-            </a:r>
-            <a:r>
-              <a:rPr lang="pt-BR" sz="2800" b="1" smtClean="0"/>
-              <a:t> </a:t>
-            </a:r>
-            <a:r>
-              <a:rPr lang="pt-BR" sz="2800" b="1" smtClean="0"/>
-              <a:t>Total</a:t>
+              <a:t>Transparência Total</a:t>
             </a:r>
             <a:endParaRPr lang="pt-BR" sz="2800" b="1"/>
           </a:p>
@@ -15468,17 +15548,15 @@
           </p:cNvPicPr>
           <p:nvPr/>
         </p:nvPicPr>
-        <p:blipFill>
-          <a:blip r:embed="rId2" cstate="print"/>
-          <a:srcRect t="47952" r="4882" b="9052"/>
-          <a:stretch>
-            <a:fillRect/>
-          </a:stretch>
+        <p:blipFill rotWithShape="1">
+          <a:blip r:embed="rId4" cstate="print"/>
+          <a:srcRect t="51812" r="4882" b="9052"/>
+          <a:stretch/>
         </p:blipFill>
         <p:spPr bwMode="auto">
           <a:xfrm>
-            <a:off x="1418897" y="2672235"/>
-            <a:ext cx="10531366" cy="2676460"/>
+            <a:off x="830317" y="3488266"/>
+            <a:ext cx="10531366" cy="2436161"/>
           </a:xfrm>
           <a:prstGeom prst="rect">
             <a:avLst/>
@@ -15495,7 +15573,7 @@
     </p:spTree>
     <p:extLst>
       <p:ext uri="{BB962C8B-B14F-4D97-AF65-F5344CB8AC3E}">
-        <p14:creationId xmlns:p14="http://schemas.microsoft.com/office/powerpoint/2010/main" xmlns="" val="557769383"/>
+        <p14:creationId xmlns:p14="http://schemas.microsoft.com/office/powerpoint/2010/main" val="557769383"/>
       </p:ext>
     </p:extLst>
   </p:cSld>
@@ -15505,7 +15583,90 @@
   <p:timing>
     <p:tnLst>
       <p:par>
-        <p:cTn id="1" dur="indefinite" restart="never" nodeType="tmRoot"/>
+        <p:cTn xmlns:p14="http://schemas.microsoft.com/office/powerpoint/2010/main" id="1" dur="indefinite" restart="never" nodeType="tmRoot">
+          <p:childTnLst>
+            <p:seq concurrent="1" nextAc="seek">
+              <p:cTn id="2" dur="indefinite" nodeType="mainSeq">
+                <p:childTnLst>
+                  <p:par>
+                    <p:cTn id="3" fill="hold">
+                      <p:stCondLst>
+                        <p:cond delay="indefinite"/>
+                      </p:stCondLst>
+                      <p:childTnLst>
+                        <p:par>
+                          <p:cTn id="4" fill="hold">
+                            <p:stCondLst>
+                              <p:cond delay="0"/>
+                            </p:stCondLst>
+                            <p:childTnLst>
+                              <p:par>
+                                <p:cTn id="5" presetID="0" presetClass="path" presetSubtype="0" accel="50000" decel="50000" fill="hold" nodeType="clickEffect">
+                                  <p:stCondLst>
+                                    <p:cond delay="0"/>
+                                  </p:stCondLst>
+                                  <p:childTnLst>
+                                    <p:animMotion origin="layout" path="M -8.54167E-6 -7.40741E-7 L -0.09167 0.46412 " pathEditMode="relative" ptsTypes="AA">
+                                      <p:cBhvr>
+                                        <p:cTn id="6" dur="2000" fill="hold"/>
+                                        <p:tgtEl>
+                                          <p:spTgt spid="2"/>
+                                        </p:tgtEl>
+                                        <p:attrNameLst>
+                                          <p:attrName>ppt_x</p:attrName>
+                                          <p:attrName>ppt_y</p:attrName>
+                                        </p:attrNameLst>
+                                      </p:cBhvr>
+                                    </p:animMotion>
+                                  </p:childTnLst>
+                                </p:cTn>
+                              </p:par>
+                              <p:par>
+                                <p:cTn id="7" presetID="0" presetClass="path" presetSubtype="0" accel="50000" decel="50000" fill="hold" nodeType="withEffect">
+                                  <p:stCondLst>
+                                    <p:cond delay="0"/>
+                                  </p:stCondLst>
+                                  <p:childTnLst>
+                                    <p:animMotion origin="layout" path="M 1.04167E-6 -4.81481E-6 L -0.025 0.4419 " pathEditMode="relative" ptsTypes="AA">
+                                      <p:cBhvr>
+                                        <p:cTn id="8" dur="2000" fill="hold"/>
+                                        <p:tgtEl>
+                                          <p:spTgt spid="3"/>
+                                        </p:tgtEl>
+                                        <p:attrNameLst>
+                                          <p:attrName>ppt_x</p:attrName>
+                                          <p:attrName>ppt_y</p:attrName>
+                                        </p:attrNameLst>
+                                      </p:cBhvr>
+                                    </p:animMotion>
+                                  </p:childTnLst>
+                                </p:cTn>
+                              </p:par>
+                            </p:childTnLst>
+                          </p:cTn>
+                        </p:par>
+                      </p:childTnLst>
+                    </p:cTn>
+                  </p:par>
+                </p:childTnLst>
+              </p:cTn>
+              <p:prevCondLst>
+                <p:cond evt="onPrev" delay="0">
+                  <p:tgtEl>
+                    <p:sldTgt/>
+                  </p:tgtEl>
+                </p:cond>
+              </p:prevCondLst>
+              <p:nextCondLst>
+                <p:cond evt="onNext" delay="0">
+                  <p:tgtEl>
+                    <p:sldTgt/>
+                  </p:tgtEl>
+                </p:cond>
+              </p:nextCondLst>
+            </p:seq>
+          </p:childTnLst>
+        </p:cTn>
       </p:par>
     </p:tnLst>
   </p:timing>
@@ -15566,14 +15727,6 @@
               </a:rPr>
               <a:t>Pontos de Contato</a:t>
             </a:r>
-            <a:endParaRPr lang="pt-BR" sz="4400" b="1" dirty="0" smtClean="0">
-              <a:solidFill>
-                <a:schemeClr val="bg1"/>
-              </a:solidFill>
-              <a:latin typeface="Kozuka Gothic Pr6N L" panose="020B0200000000000000" pitchFamily="34" charset="-128"/>
-              <a:ea typeface="Kozuka Gothic Pr6N L" panose="020B0200000000000000" pitchFamily="34" charset="-128"/>
-              <a:cs typeface="Arial" panose="020B0604020202020204" pitchFamily="34" charset="0"/>
-            </a:endParaRPr>
           </a:p>
         </p:txBody>
       </p:sp>
@@ -15900,7 +16053,7 @@
     </p:spTree>
     <p:extLst>
       <p:ext uri="{BB962C8B-B14F-4D97-AF65-F5344CB8AC3E}">
-        <p14:creationId xmlns:p14="http://schemas.microsoft.com/office/powerpoint/2010/main" xmlns="" val="557769383"/>
+        <p14:creationId xmlns:p14="http://schemas.microsoft.com/office/powerpoint/2010/main" val="557769383"/>
       </p:ext>
     </p:extLst>
   </p:cSld>
@@ -15910,7 +16063,7 @@
   <p:timing>
     <p:tnLst>
       <p:par>
-        <p:cTn id="1" dur="indefinite" restart="never" nodeType="tmRoot"/>
+        <p:cTn xmlns:p14="http://schemas.microsoft.com/office/powerpoint/2010/main" id="1" dur="indefinite" restart="never" nodeType="tmRoot"/>
       </p:par>
     </p:tnLst>
   </p:timing>
@@ -16769,7 +16922,7 @@
   </a:extraClrSchemeLst>
   <a:extLst>
     <a:ext uri="{05A4C25C-085E-4340-85A3-A5531E510DB2}">
-      <thm15:themeFamily xmlns:thm15="http://schemas.microsoft.com/office/thememl/2012/main" xmlns="" name="Office Theme" id="{62F939B6-93AF-4DB8-9C6B-D6C7DFDC589F}" vid="{4A3C46E8-61CC-4603-A589-7422A47A8E4A}"/>
+      <thm15:themeFamily xmlns="" xmlns:thm15="http://schemas.microsoft.com/office/thememl/2012/main" name="Office Theme" id="{62F939B6-93AF-4DB8-9C6B-D6C7DFDC589F}" vid="{4A3C46E8-61CC-4603-A589-7422A47A8E4A}"/>
     </a:ext>
   </a:extLst>
 </a:theme>
@@ -17313,7 +17466,7 @@
   <a:extraClrSchemeLst/>
   <a:extLst>
     <a:ext uri="{05A4C25C-085E-4340-85A3-A5531E510DB2}">
-      <thm15:themeFamily xmlns:thm15="http://schemas.microsoft.com/office/thememl/2012/main" xmlns="" name="Office Theme" id="{62F939B6-93AF-4DB8-9C6B-D6C7DFDC589F}" vid="{4A3C46E8-61CC-4603-A589-7422A47A8E4A}"/>
+      <thm15:themeFamily xmlns="" xmlns:thm15="http://schemas.microsoft.com/office/thememl/2012/main" name="Office Theme" id="{62F939B6-93AF-4DB8-9C6B-D6C7DFDC589F}" vid="{4A3C46E8-61CC-4603-A589-7422A47A8E4A}"/>
     </a:ext>
   </a:extLst>
 </a:theme>

</xml_diff>